<commit_message>
Debouncing hinzugefügt und PowerPoint ein bisschen gemacht
</commit_message>
<xml_diff>
--- a/Recap_SW5_Ineichen_Stecher.pptx
+++ b/Recap_SW5_Ineichen_Stecher.pptx
@@ -6,6 +6,10 @@
   </p:sldMasterIdLst>
   <p:sldIdLst>
     <p:sldId id="256" r:id="rId2"/>
+    <p:sldId id="257" r:id="rId3"/>
+    <p:sldId id="258" r:id="rId4"/>
+    <p:sldId id="259" r:id="rId5"/>
+    <p:sldId id="260" r:id="rId6"/>
   </p:sldIdLst>
   <p:sldSz cx="12192000" cy="6858000"/>
   <p:notesSz cx="6858000" cy="9144000"/>
@@ -104,6 +108,11 @@
       </a:defRPr>
     </a:lvl9pPr>
   </p:defaultTextStyle>
+  <p:extLst>
+    <p:ext uri="{EFAFB233-063F-42B5-8137-9DF3F51BA10A}">
+      <p15:sldGuideLst xmlns:p15="http://schemas.microsoft.com/office/powerpoint/2012/main"/>
+    </p:ext>
+  </p:extLst>
 </p:presentation>
 </file>
 
@@ -238,7 +247,7 @@
           <a:p>
             <a:fld id="{CFF0E3E0-6B59-4FD8-AEDD-9E53307F786E}" type="datetimeFigureOut">
               <a:rPr lang="de-CH" smtClean="0"/>
-              <a:t>20.10.2016</a:t>
+              <a:t>21.10.2016</a:t>
             </a:fld>
             <a:endParaRPr lang="de-CH"/>
           </a:p>
@@ -408,7 +417,7 @@
           <a:p>
             <a:fld id="{CFF0E3E0-6B59-4FD8-AEDD-9E53307F786E}" type="datetimeFigureOut">
               <a:rPr lang="de-CH" smtClean="0"/>
-              <a:t>20.10.2016</a:t>
+              <a:t>21.10.2016</a:t>
             </a:fld>
             <a:endParaRPr lang="de-CH"/>
           </a:p>
@@ -588,7 +597,7 @@
           <a:p>
             <a:fld id="{CFF0E3E0-6B59-4FD8-AEDD-9E53307F786E}" type="datetimeFigureOut">
               <a:rPr lang="de-CH" smtClean="0"/>
-              <a:t>20.10.2016</a:t>
+              <a:t>21.10.2016</a:t>
             </a:fld>
             <a:endParaRPr lang="de-CH"/>
           </a:p>
@@ -758,7 +767,7 @@
           <a:p>
             <a:fld id="{CFF0E3E0-6B59-4FD8-AEDD-9E53307F786E}" type="datetimeFigureOut">
               <a:rPr lang="de-CH" smtClean="0"/>
-              <a:t>20.10.2016</a:t>
+              <a:t>21.10.2016</a:t>
             </a:fld>
             <a:endParaRPr lang="de-CH"/>
           </a:p>
@@ -1004,7 +1013,7 @@
           <a:p>
             <a:fld id="{CFF0E3E0-6B59-4FD8-AEDD-9E53307F786E}" type="datetimeFigureOut">
               <a:rPr lang="de-CH" smtClean="0"/>
-              <a:t>20.10.2016</a:t>
+              <a:t>21.10.2016</a:t>
             </a:fld>
             <a:endParaRPr lang="de-CH"/>
           </a:p>
@@ -1236,7 +1245,7 @@
           <a:p>
             <a:fld id="{CFF0E3E0-6B59-4FD8-AEDD-9E53307F786E}" type="datetimeFigureOut">
               <a:rPr lang="de-CH" smtClean="0"/>
-              <a:t>20.10.2016</a:t>
+              <a:t>21.10.2016</a:t>
             </a:fld>
             <a:endParaRPr lang="de-CH"/>
           </a:p>
@@ -1603,7 +1612,7 @@
           <a:p>
             <a:fld id="{CFF0E3E0-6B59-4FD8-AEDD-9E53307F786E}" type="datetimeFigureOut">
               <a:rPr lang="de-CH" smtClean="0"/>
-              <a:t>20.10.2016</a:t>
+              <a:t>21.10.2016</a:t>
             </a:fld>
             <a:endParaRPr lang="de-CH"/>
           </a:p>
@@ -1721,7 +1730,7 @@
           <a:p>
             <a:fld id="{CFF0E3E0-6B59-4FD8-AEDD-9E53307F786E}" type="datetimeFigureOut">
               <a:rPr lang="de-CH" smtClean="0"/>
-              <a:t>20.10.2016</a:t>
+              <a:t>21.10.2016</a:t>
             </a:fld>
             <a:endParaRPr lang="de-CH"/>
           </a:p>
@@ -1816,7 +1825,7 @@
           <a:p>
             <a:fld id="{CFF0E3E0-6B59-4FD8-AEDD-9E53307F786E}" type="datetimeFigureOut">
               <a:rPr lang="de-CH" smtClean="0"/>
-              <a:t>20.10.2016</a:t>
+              <a:t>21.10.2016</a:t>
             </a:fld>
             <a:endParaRPr lang="de-CH"/>
           </a:p>
@@ -2093,7 +2102,7 @@
           <a:p>
             <a:fld id="{CFF0E3E0-6B59-4FD8-AEDD-9E53307F786E}" type="datetimeFigureOut">
               <a:rPr lang="de-CH" smtClean="0"/>
-              <a:t>20.10.2016</a:t>
+              <a:t>21.10.2016</a:t>
             </a:fld>
             <a:endParaRPr lang="de-CH"/>
           </a:p>
@@ -2346,7 +2355,7 @@
           <a:p>
             <a:fld id="{CFF0E3E0-6B59-4FD8-AEDD-9E53307F786E}" type="datetimeFigureOut">
               <a:rPr lang="de-CH" smtClean="0"/>
-              <a:t>20.10.2016</a:t>
+              <a:t>21.10.2016</a:t>
             </a:fld>
             <a:endParaRPr lang="de-CH"/>
           </a:p>
@@ -2559,7 +2568,7 @@
           <a:p>
             <a:fld id="{CFF0E3E0-6B59-4FD8-AEDD-9E53307F786E}" type="datetimeFigureOut">
               <a:rPr lang="de-CH" smtClean="0"/>
-              <a:t>20.10.2016</a:t>
+              <a:t>21.10.2016</a:t>
             </a:fld>
             <a:endParaRPr lang="de-CH"/>
           </a:p>
@@ -2979,7 +2988,11 @@
           <a:bodyPr/>
           <a:lstStyle/>
           <a:p>
-            <a:endParaRPr lang="de-CH"/>
+            <a:r>
+              <a:rPr lang="en-CA" dirty="0"/>
+              <a:t>Recap SW5	- RTOS</a:t>
+            </a:r>
+            <a:endParaRPr lang="de-CH" dirty="0"/>
           </a:p>
         </p:txBody>
       </p:sp>
@@ -2998,7 +3011,19 @@
           <a:bodyPr/>
           <a:lstStyle/>
           <a:p>
-            <a:endParaRPr lang="de-CH"/>
+            <a:r>
+              <a:rPr lang="en-CA" dirty="0"/>
+              <a:t>Kilian </a:t>
+            </a:r>
+            <a:r>
+              <a:rPr lang="en-CA" dirty="0" err="1"/>
+              <a:t>Ineichen</a:t>
+            </a:r>
+            <a:r>
+              <a:rPr lang="en-CA" dirty="0"/>
+              <a:t> und Silvano Stecher</a:t>
+            </a:r>
+            <a:endParaRPr lang="de-CH" dirty="0"/>
           </a:p>
         </p:txBody>
       </p:sp>
@@ -3006,6 +3031,607 @@
     <p:extLst>
       <p:ext uri="{BB962C8B-B14F-4D97-AF65-F5344CB8AC3E}">
         <p14:creationId xmlns:p14="http://schemas.microsoft.com/office/powerpoint/2010/main" val="264425684"/>
+      </p:ext>
+    </p:extLst>
+  </p:cSld>
+  <p:clrMapOvr>
+    <a:masterClrMapping/>
+  </p:clrMapOvr>
+</p:sld>
+</file>
+
+<file path=ppt/slides/slide2.xml><?xml version="1.0" encoding="utf-8"?>
+<p:sld xmlns:a="http://schemas.openxmlformats.org/drawingml/2006/main" xmlns:r="http://schemas.openxmlformats.org/officeDocument/2006/relationships" xmlns:p="http://schemas.openxmlformats.org/presentationml/2006/main">
+  <p:cSld>
+    <p:spTree>
+      <p:nvGrpSpPr>
+        <p:cNvPr id="1" name=""/>
+        <p:cNvGrpSpPr/>
+        <p:nvPr/>
+      </p:nvGrpSpPr>
+      <p:grpSpPr>
+        <a:xfrm>
+          <a:off x="0" y="0"/>
+          <a:ext cx="0" cy="0"/>
+          <a:chOff x="0" y="0"/>
+          <a:chExt cx="0" cy="0"/>
+        </a:xfrm>
+      </p:grpSpPr>
+      <p:sp>
+        <p:nvSpPr>
+          <p:cNvPr id="2" name="Titel 1"/>
+          <p:cNvSpPr>
+            <a:spLocks noGrp="1"/>
+          </p:cNvSpPr>
+          <p:nvPr>
+            <p:ph type="title"/>
+          </p:nvPr>
+        </p:nvSpPr>
+        <p:spPr/>
+        <p:txBody>
+          <a:bodyPr/>
+          <a:lstStyle/>
+          <a:p>
+            <a:r>
+              <a:rPr lang="en-CA" dirty="0" err="1"/>
+              <a:t>Wieso</a:t>
+            </a:r>
+            <a:r>
+              <a:rPr lang="en-CA" dirty="0"/>
+              <a:t> RTOS?</a:t>
+            </a:r>
+            <a:endParaRPr lang="de-CH" dirty="0"/>
+          </a:p>
+        </p:txBody>
+      </p:sp>
+      <p:sp>
+        <p:nvSpPr>
+          <p:cNvPr id="3" name="Inhaltsplatzhalter 2"/>
+          <p:cNvSpPr>
+            <a:spLocks noGrp="1"/>
+          </p:cNvSpPr>
+          <p:nvPr>
+            <p:ph idx="1"/>
+          </p:nvPr>
+        </p:nvSpPr>
+        <p:spPr/>
+        <p:txBody>
+          <a:bodyPr/>
+          <a:lstStyle/>
+          <a:p>
+            <a:r>
+              <a:rPr lang="en-CA" dirty="0"/>
+              <a:t>Synchronisation</a:t>
+            </a:r>
+          </a:p>
+          <a:p>
+            <a:r>
+              <a:rPr lang="en-CA" dirty="0" err="1"/>
+              <a:t>Quasigleichzeitig</a:t>
+            </a:r>
+            <a:r>
+              <a:rPr lang="en-CA" dirty="0"/>
+              <a:t> </a:t>
+            </a:r>
+          </a:p>
+          <a:p>
+            <a:r>
+              <a:rPr lang="en-CA" dirty="0" err="1"/>
+              <a:t>Hardwarenahe</a:t>
+            </a:r>
+            <a:r>
+              <a:rPr lang="en-CA" dirty="0"/>
+              <a:t> </a:t>
+            </a:r>
+            <a:r>
+              <a:rPr lang="en-CA" dirty="0">
+                <a:sym typeface="Wingdings" panose="05000000000000000000" pitchFamily="2" charset="2"/>
+              </a:rPr>
+              <a:t> </a:t>
+            </a:r>
+            <a:r>
+              <a:rPr lang="en-CA" dirty="0" err="1">
+                <a:sym typeface="Wingdings" panose="05000000000000000000" pitchFamily="2" charset="2"/>
+              </a:rPr>
+              <a:t>bessere</a:t>
+            </a:r>
+            <a:r>
+              <a:rPr lang="en-CA" dirty="0">
+                <a:sym typeface="Wingdings" panose="05000000000000000000" pitchFamily="2" charset="2"/>
+              </a:rPr>
+              <a:t> Performance</a:t>
+            </a:r>
+          </a:p>
+          <a:p>
+            <a:pPr lvl="1"/>
+            <a:r>
+              <a:rPr lang="en-CA" dirty="0">
+                <a:sym typeface="Wingdings" panose="05000000000000000000" pitchFamily="2" charset="2"/>
+              </a:rPr>
+              <a:t>OS </a:t>
+            </a:r>
+            <a:r>
+              <a:rPr lang="en-CA" dirty="0" err="1">
+                <a:sym typeface="Wingdings" panose="05000000000000000000" pitchFamily="2" charset="2"/>
+              </a:rPr>
+              <a:t>würde</a:t>
+            </a:r>
+            <a:r>
+              <a:rPr lang="en-CA" dirty="0">
+                <a:sym typeface="Wingdings" panose="05000000000000000000" pitchFamily="2" charset="2"/>
+              </a:rPr>
+              <a:t> </a:t>
+            </a:r>
+            <a:r>
+              <a:rPr lang="en-CA" dirty="0" err="1">
+                <a:sym typeface="Wingdings" panose="05000000000000000000" pitchFamily="2" charset="2"/>
+              </a:rPr>
+              <a:t>Treiber</a:t>
+            </a:r>
+            <a:r>
+              <a:rPr lang="en-CA" dirty="0">
+                <a:sym typeface="Wingdings" panose="05000000000000000000" pitchFamily="2" charset="2"/>
+              </a:rPr>
+              <a:t> </a:t>
+            </a:r>
+            <a:r>
+              <a:rPr lang="en-CA" dirty="0" err="1">
+                <a:sym typeface="Wingdings" panose="05000000000000000000" pitchFamily="2" charset="2"/>
+              </a:rPr>
+              <a:t>benötigen</a:t>
+            </a:r>
+            <a:endParaRPr lang="en-CA" dirty="0">
+              <a:sym typeface="Wingdings" panose="05000000000000000000" pitchFamily="2" charset="2"/>
+            </a:endParaRPr>
+          </a:p>
+          <a:p>
+            <a:pPr lvl="1"/>
+            <a:r>
+              <a:rPr lang="en-CA" dirty="0">
+                <a:sym typeface="Wingdings" panose="05000000000000000000" pitchFamily="2" charset="2"/>
+              </a:rPr>
+              <a:t>RTOS </a:t>
+            </a:r>
+            <a:r>
+              <a:rPr lang="en-CA" dirty="0" err="1">
+                <a:sym typeface="Wingdings" panose="05000000000000000000" pitchFamily="2" charset="2"/>
+              </a:rPr>
+              <a:t>direkt</a:t>
+            </a:r>
+            <a:r>
+              <a:rPr lang="en-CA" dirty="0">
+                <a:sym typeface="Wingdings" panose="05000000000000000000" pitchFamily="2" charset="2"/>
+              </a:rPr>
+              <a:t> </a:t>
+            </a:r>
+            <a:r>
+              <a:rPr lang="en-CA" dirty="0" err="1">
+                <a:sym typeface="Wingdings" panose="05000000000000000000" pitchFamily="2" charset="2"/>
+              </a:rPr>
+              <a:t>mit</a:t>
+            </a:r>
+            <a:r>
+              <a:rPr lang="en-CA" dirty="0">
+                <a:sym typeface="Wingdings" panose="05000000000000000000" pitchFamily="2" charset="2"/>
+              </a:rPr>
+              <a:t> Hardware</a:t>
+            </a:r>
+          </a:p>
+          <a:p>
+            <a:r>
+              <a:rPr lang="en-CA" dirty="0">
+                <a:sym typeface="Wingdings" panose="05000000000000000000" pitchFamily="2" charset="2"/>
+              </a:rPr>
+              <a:t>Low Power und </a:t>
+            </a:r>
+            <a:r>
+              <a:rPr lang="en-CA" dirty="0" err="1">
+                <a:sym typeface="Wingdings" panose="05000000000000000000" pitchFamily="2" charset="2"/>
+              </a:rPr>
+              <a:t>geringe</a:t>
+            </a:r>
+            <a:r>
+              <a:rPr lang="en-CA" dirty="0">
+                <a:sym typeface="Wingdings" panose="05000000000000000000" pitchFamily="2" charset="2"/>
+              </a:rPr>
+              <a:t> </a:t>
+            </a:r>
+            <a:r>
+              <a:rPr lang="en-CA" dirty="0" err="1">
+                <a:sym typeface="Wingdings" panose="05000000000000000000" pitchFamily="2" charset="2"/>
+              </a:rPr>
+              <a:t>Bootzeit</a:t>
+            </a:r>
+            <a:endParaRPr lang="en-CA" dirty="0"/>
+          </a:p>
+          <a:p>
+            <a:endParaRPr lang="de-CH" dirty="0"/>
+          </a:p>
+        </p:txBody>
+      </p:sp>
+    </p:spTree>
+    <p:extLst>
+      <p:ext uri="{BB962C8B-B14F-4D97-AF65-F5344CB8AC3E}">
+        <p14:creationId xmlns:p14="http://schemas.microsoft.com/office/powerpoint/2010/main" val="1777177950"/>
+      </p:ext>
+    </p:extLst>
+  </p:cSld>
+  <p:clrMapOvr>
+    <a:masterClrMapping/>
+  </p:clrMapOvr>
+</p:sld>
+</file>
+
+<file path=ppt/slides/slide3.xml><?xml version="1.0" encoding="utf-8"?>
+<p:sld xmlns:a="http://schemas.openxmlformats.org/drawingml/2006/main" xmlns:r="http://schemas.openxmlformats.org/officeDocument/2006/relationships" xmlns:p="http://schemas.openxmlformats.org/presentationml/2006/main">
+  <p:cSld>
+    <p:spTree>
+      <p:nvGrpSpPr>
+        <p:cNvPr id="1" name=""/>
+        <p:cNvGrpSpPr/>
+        <p:nvPr/>
+      </p:nvGrpSpPr>
+      <p:grpSpPr>
+        <a:xfrm>
+          <a:off x="0" y="0"/>
+          <a:ext cx="0" cy="0"/>
+          <a:chOff x="0" y="0"/>
+          <a:chExt cx="0" cy="0"/>
+        </a:xfrm>
+      </p:grpSpPr>
+      <p:sp>
+        <p:nvSpPr>
+          <p:cNvPr id="2" name="Titel 1"/>
+          <p:cNvSpPr>
+            <a:spLocks noGrp="1"/>
+          </p:cNvSpPr>
+          <p:nvPr>
+            <p:ph type="title"/>
+          </p:nvPr>
+        </p:nvSpPr>
+        <p:spPr/>
+        <p:txBody>
+          <a:bodyPr/>
+          <a:lstStyle/>
+          <a:p>
+            <a:r>
+              <a:rPr lang="en-CA" dirty="0"/>
+              <a:t>Scheduler</a:t>
+            </a:r>
+            <a:endParaRPr lang="de-CH" dirty="0"/>
+          </a:p>
+        </p:txBody>
+      </p:sp>
+      <p:pic>
+        <p:nvPicPr>
+          <p:cNvPr id="4" name="Inhaltsplatzhalter 3"/>
+          <p:cNvPicPr>
+            <a:picLocks noGrp="1" noChangeAspect="1"/>
+          </p:cNvPicPr>
+          <p:nvPr>
+            <p:ph idx="1"/>
+          </p:nvPr>
+        </p:nvPicPr>
+        <p:blipFill>
+          <a:blip r:embed="rId2"/>
+          <a:stretch>
+            <a:fillRect/>
+          </a:stretch>
+        </p:blipFill>
+        <p:spPr>
+          <a:xfrm>
+            <a:off x="1843341" y="1428751"/>
+            <a:ext cx="8505317" cy="3817902"/>
+          </a:xfrm>
+          <a:prstGeom prst="rect">
+            <a:avLst/>
+          </a:prstGeom>
+        </p:spPr>
+      </p:pic>
+    </p:spTree>
+    <p:extLst>
+      <p:ext uri="{BB962C8B-B14F-4D97-AF65-F5344CB8AC3E}">
+        <p14:creationId xmlns:p14="http://schemas.microsoft.com/office/powerpoint/2010/main" val="1916690929"/>
+      </p:ext>
+    </p:extLst>
+  </p:cSld>
+  <p:clrMapOvr>
+    <a:masterClrMapping/>
+  </p:clrMapOvr>
+</p:sld>
+</file>
+
+<file path=ppt/slides/slide4.xml><?xml version="1.0" encoding="utf-8"?>
+<p:sld xmlns:a="http://schemas.openxmlformats.org/drawingml/2006/main" xmlns:r="http://schemas.openxmlformats.org/officeDocument/2006/relationships" xmlns:p="http://schemas.openxmlformats.org/presentationml/2006/main">
+  <p:cSld>
+    <p:spTree>
+      <p:nvGrpSpPr>
+        <p:cNvPr id="1" name=""/>
+        <p:cNvGrpSpPr/>
+        <p:nvPr/>
+      </p:nvGrpSpPr>
+      <p:grpSpPr>
+        <a:xfrm>
+          <a:off x="0" y="0"/>
+          <a:ext cx="0" cy="0"/>
+          <a:chOff x="0" y="0"/>
+          <a:chExt cx="0" cy="0"/>
+        </a:xfrm>
+      </p:grpSpPr>
+      <p:sp>
+        <p:nvSpPr>
+          <p:cNvPr id="2" name="Titel 1"/>
+          <p:cNvSpPr>
+            <a:spLocks noGrp="1"/>
+          </p:cNvSpPr>
+          <p:nvPr>
+            <p:ph type="title"/>
+          </p:nvPr>
+        </p:nvSpPr>
+        <p:spPr/>
+        <p:txBody>
+          <a:bodyPr/>
+          <a:lstStyle/>
+          <a:p>
+            <a:r>
+              <a:rPr lang="en-CA" dirty="0"/>
+              <a:t>OS Process States</a:t>
+            </a:r>
+            <a:endParaRPr lang="de-CH" dirty="0"/>
+          </a:p>
+        </p:txBody>
+      </p:sp>
+      <p:pic>
+        <p:nvPicPr>
+          <p:cNvPr id="4" name="Inhaltsplatzhalter 3"/>
+          <p:cNvPicPr>
+            <a:picLocks noGrp="1" noChangeAspect="1"/>
+          </p:cNvPicPr>
+          <p:nvPr>
+            <p:ph idx="1"/>
+          </p:nvPr>
+        </p:nvPicPr>
+        <p:blipFill>
+          <a:blip r:embed="rId2"/>
+          <a:stretch>
+            <a:fillRect/>
+          </a:stretch>
+        </p:blipFill>
+        <p:spPr>
+          <a:xfrm>
+            <a:off x="2222549" y="1690688"/>
+            <a:ext cx="7390823" cy="4122186"/>
+          </a:xfrm>
+          <a:prstGeom prst="rect">
+            <a:avLst/>
+          </a:prstGeom>
+        </p:spPr>
+      </p:pic>
+    </p:spTree>
+    <p:extLst>
+      <p:ext uri="{BB962C8B-B14F-4D97-AF65-F5344CB8AC3E}">
+        <p14:creationId xmlns:p14="http://schemas.microsoft.com/office/powerpoint/2010/main" val="178852882"/>
+      </p:ext>
+    </p:extLst>
+  </p:cSld>
+  <p:clrMapOvr>
+    <a:masterClrMapping/>
+  </p:clrMapOvr>
+</p:sld>
+</file>
+
+<file path=ppt/slides/slide5.xml><?xml version="1.0" encoding="utf-8"?>
+<p:sld xmlns:a="http://schemas.openxmlformats.org/drawingml/2006/main" xmlns:r="http://schemas.openxmlformats.org/officeDocument/2006/relationships" xmlns:p="http://schemas.openxmlformats.org/presentationml/2006/main">
+  <p:cSld>
+    <p:spTree>
+      <p:nvGrpSpPr>
+        <p:cNvPr id="1" name=""/>
+        <p:cNvGrpSpPr/>
+        <p:nvPr/>
+      </p:nvGrpSpPr>
+      <p:grpSpPr>
+        <a:xfrm>
+          <a:off x="0" y="0"/>
+          <a:ext cx="0" cy="0"/>
+          <a:chOff x="0" y="0"/>
+          <a:chExt cx="0" cy="0"/>
+        </a:xfrm>
+      </p:grpSpPr>
+      <p:sp>
+        <p:nvSpPr>
+          <p:cNvPr id="2" name="Titel 1"/>
+          <p:cNvSpPr>
+            <a:spLocks noGrp="1"/>
+          </p:cNvSpPr>
+          <p:nvPr>
+            <p:ph type="title"/>
+          </p:nvPr>
+        </p:nvSpPr>
+        <p:spPr/>
+        <p:txBody>
+          <a:bodyPr/>
+          <a:lstStyle/>
+          <a:p>
+            <a:r>
+              <a:rPr lang="en-CA" dirty="0" err="1"/>
+              <a:t>Fragen</a:t>
+            </a:r>
+            <a:r>
+              <a:rPr lang="en-CA" dirty="0"/>
+              <a:t>:</a:t>
+            </a:r>
+            <a:endParaRPr lang="de-CH" dirty="0"/>
+          </a:p>
+        </p:txBody>
+      </p:sp>
+      <p:sp>
+        <p:nvSpPr>
+          <p:cNvPr id="3" name="Inhaltsplatzhalter 2"/>
+          <p:cNvSpPr>
+            <a:spLocks noGrp="1"/>
+          </p:cNvSpPr>
+          <p:nvPr>
+            <p:ph idx="1"/>
+          </p:nvPr>
+        </p:nvSpPr>
+        <p:spPr/>
+        <p:txBody>
+          <a:bodyPr/>
+          <a:lstStyle/>
+          <a:p>
+            <a:pPr marL="0" indent="0">
+              <a:buNone/>
+            </a:pPr>
+            <a:r>
+              <a:rPr lang="en-CA" dirty="0"/>
+              <a:t>PREN </a:t>
+            </a:r>
+            <a:r>
+              <a:rPr lang="en-CA" dirty="0">
+                <a:sym typeface="Wingdings" panose="05000000000000000000" pitchFamily="2" charset="2"/>
+              </a:rPr>
+              <a:t> </a:t>
+            </a:r>
+            <a:r>
+              <a:rPr lang="en-CA" dirty="0" err="1">
+                <a:sym typeface="Wingdings" panose="05000000000000000000" pitchFamily="2" charset="2"/>
+              </a:rPr>
+              <a:t>wieso</a:t>
+            </a:r>
+            <a:r>
+              <a:rPr lang="en-CA" dirty="0">
+                <a:sym typeface="Wingdings" panose="05000000000000000000" pitchFamily="2" charset="2"/>
+              </a:rPr>
+              <a:t> </a:t>
+            </a:r>
+            <a:r>
+              <a:rPr lang="en-CA" dirty="0" err="1">
+                <a:sym typeface="Wingdings" panose="05000000000000000000" pitchFamily="2" charset="2"/>
+              </a:rPr>
+              <a:t>sollte</a:t>
+            </a:r>
+            <a:r>
+              <a:rPr lang="en-CA" dirty="0">
+                <a:sym typeface="Wingdings" panose="05000000000000000000" pitchFamily="2" charset="2"/>
+              </a:rPr>
+              <a:t> </a:t>
+            </a:r>
+            <a:r>
+              <a:rPr lang="en-CA" dirty="0" err="1">
+                <a:sym typeface="Wingdings" panose="05000000000000000000" pitchFamily="2" charset="2"/>
+              </a:rPr>
+              <a:t>ein</a:t>
+            </a:r>
+            <a:r>
+              <a:rPr lang="en-CA" dirty="0">
+                <a:sym typeface="Wingdings" panose="05000000000000000000" pitchFamily="2" charset="2"/>
+              </a:rPr>
+              <a:t> OS </a:t>
+            </a:r>
+            <a:r>
+              <a:rPr lang="en-CA" dirty="0" err="1">
+                <a:sym typeface="Wingdings" panose="05000000000000000000" pitchFamily="2" charset="2"/>
+              </a:rPr>
+              <a:t>oder</a:t>
+            </a:r>
+            <a:r>
+              <a:rPr lang="en-CA" dirty="0">
+                <a:sym typeface="Wingdings" panose="05000000000000000000" pitchFamily="2" charset="2"/>
+              </a:rPr>
+              <a:t> </a:t>
+            </a:r>
+            <a:r>
+              <a:rPr lang="en-CA" dirty="0" err="1">
+                <a:sym typeface="Wingdings" panose="05000000000000000000" pitchFamily="2" charset="2"/>
+              </a:rPr>
+              <a:t>wiso</a:t>
+            </a:r>
+            <a:r>
+              <a:rPr lang="en-CA" dirty="0">
+                <a:sym typeface="Wingdings" panose="05000000000000000000" pitchFamily="2" charset="2"/>
+              </a:rPr>
+              <a:t> </a:t>
+            </a:r>
+            <a:r>
+              <a:rPr lang="en-CA" dirty="0" err="1">
+                <a:sym typeface="Wingdings" panose="05000000000000000000" pitchFamily="2" charset="2"/>
+              </a:rPr>
+              <a:t>sollte</a:t>
+            </a:r>
+            <a:r>
+              <a:rPr lang="en-CA" dirty="0">
+                <a:sym typeface="Wingdings" panose="05000000000000000000" pitchFamily="2" charset="2"/>
+              </a:rPr>
+              <a:t> </a:t>
+            </a:r>
+            <a:r>
+              <a:rPr lang="en-CA" dirty="0" err="1">
+                <a:sym typeface="Wingdings" panose="05000000000000000000" pitchFamily="2" charset="2"/>
+              </a:rPr>
+              <a:t>ein</a:t>
+            </a:r>
+            <a:r>
+              <a:rPr lang="en-CA" dirty="0">
+                <a:sym typeface="Wingdings" panose="05000000000000000000" pitchFamily="2" charset="2"/>
+              </a:rPr>
+              <a:t> RTOS </a:t>
+            </a:r>
+            <a:r>
+              <a:rPr lang="en-CA" dirty="0" err="1">
+                <a:sym typeface="Wingdings" panose="05000000000000000000" pitchFamily="2" charset="2"/>
+              </a:rPr>
+              <a:t>verwendet</a:t>
+            </a:r>
+            <a:r>
+              <a:rPr lang="en-CA" dirty="0">
+                <a:sym typeface="Wingdings" panose="05000000000000000000" pitchFamily="2" charset="2"/>
+              </a:rPr>
+              <a:t> warden? Was </a:t>
+            </a:r>
+            <a:r>
+              <a:rPr lang="en-CA" dirty="0" err="1">
+                <a:sym typeface="Wingdings" panose="05000000000000000000" pitchFamily="2" charset="2"/>
+              </a:rPr>
+              <a:t>spricht</a:t>
+            </a:r>
+            <a:r>
+              <a:rPr lang="en-CA" dirty="0">
+                <a:sym typeface="Wingdings" panose="05000000000000000000" pitchFamily="2" charset="2"/>
+              </a:rPr>
+              <a:t> </a:t>
+            </a:r>
+            <a:r>
+              <a:rPr lang="en-CA" dirty="0" err="1">
+                <a:sym typeface="Wingdings" panose="05000000000000000000" pitchFamily="2" charset="2"/>
+              </a:rPr>
+              <a:t>dagegen</a:t>
+            </a:r>
+            <a:r>
+              <a:rPr lang="en-CA" dirty="0">
+                <a:sym typeface="Wingdings" panose="05000000000000000000" pitchFamily="2" charset="2"/>
+              </a:rPr>
+              <a:t> was </a:t>
+            </a:r>
+            <a:r>
+              <a:rPr lang="en-CA" dirty="0" err="1">
+                <a:sym typeface="Wingdings" panose="05000000000000000000" pitchFamily="2" charset="2"/>
+              </a:rPr>
+              <a:t>dafür</a:t>
+            </a:r>
+            <a:r>
+              <a:rPr lang="en-CA" dirty="0">
+                <a:sym typeface="Wingdings" panose="05000000000000000000" pitchFamily="2" charset="2"/>
+              </a:rPr>
+              <a:t>. </a:t>
+            </a:r>
+            <a:endParaRPr lang="de-CH" dirty="0"/>
+          </a:p>
+        </p:txBody>
+      </p:sp>
+    </p:spTree>
+    <p:extLst>
+      <p:ext uri="{BB962C8B-B14F-4D97-AF65-F5344CB8AC3E}">
+        <p14:creationId xmlns:p14="http://schemas.microsoft.com/office/powerpoint/2010/main" val="2611258350"/>
       </p:ext>
     </p:extLst>
   </p:cSld>

</xml_diff>

<commit_message>
recap: added some slides and questions
</commit_message>
<xml_diff>
--- a/Recap_SW5_Ineichen_Stecher.pptx
+++ b/Recap_SW5_Ineichen_Stecher.pptx
@@ -20,7 +20,10 @@
     <p:sldId id="268" r:id="rId14"/>
     <p:sldId id="269" r:id="rId15"/>
     <p:sldId id="271" r:id="rId16"/>
-    <p:sldId id="260" r:id="rId17"/>
+    <p:sldId id="272" r:id="rId17"/>
+    <p:sldId id="273" r:id="rId18"/>
+    <p:sldId id="260" r:id="rId19"/>
+    <p:sldId id="274" r:id="rId20"/>
   </p:sldIdLst>
   <p:sldSz cx="12192000" cy="6858000"/>
   <p:notesSz cx="6858000" cy="9144000"/>
@@ -4856,7 +4859,6 @@
               <a:rPr lang="de-CH" dirty="0"/>
               <a:t>Tasks</a:t>
             </a:r>
-            <a:endParaRPr lang="de-CH" dirty="0"/>
           </a:p>
         </p:txBody>
       </p:sp>
@@ -4875,6 +4877,21 @@
           <a:bodyPr/>
           <a:lstStyle/>
           <a:p>
+            <a:pPr marL="0" indent="0">
+              <a:buNone/>
+            </a:pPr>
+            <a:r>
+              <a:rPr lang="en-US" dirty="0"/>
+              <a:t> </a:t>
+            </a:r>
+            <a:r>
+              <a:rPr lang="en-US" dirty="0" err="1"/>
+              <a:t>vTaskDelay</a:t>
+            </a:r>
+            <a:r>
+              <a:rPr lang="en-US" dirty="0"/>
+              <a:t>() it will block</a:t>
+            </a:r>
             <a:endParaRPr lang="de-CH" dirty="0"/>
           </a:p>
         </p:txBody>
@@ -4895,7 +4912,7 @@
         </p:blipFill>
         <p:spPr>
           <a:xfrm>
-            <a:off x="3441263" y="1792322"/>
+            <a:off x="5653971" y="1792322"/>
             <a:ext cx="4167104" cy="4470666"/>
           </a:xfrm>
           <a:prstGeom prst="rect">
@@ -4949,12 +4966,340 @@
           <a:lstStyle/>
           <a:p>
             <a:r>
-              <a:rPr lang="en-CA" dirty="0" err="1"/>
-              <a:t>Fragen</a:t>
-            </a:r>
+              <a:rPr lang="de-CH" b="1" dirty="0" err="1"/>
+              <a:t>FreeRTOS</a:t>
+            </a:r>
+            <a:r>
+              <a:rPr lang="de-CH" dirty="0"/>
+              <a:t> </a:t>
+            </a:r>
+            <a:br>
+              <a:rPr lang="de-CH" dirty="0"/>
+            </a:br>
+            <a:r>
+              <a:rPr lang="de-CH" dirty="0"/>
+              <a:t>Task </a:t>
+            </a:r>
+            <a:r>
+              <a:rPr lang="de-CH" dirty="0" err="1"/>
+              <a:t>creation</a:t>
+            </a:r>
+            <a:endParaRPr lang="de-CH" dirty="0"/>
+          </a:p>
+        </p:txBody>
+      </p:sp>
+      <p:sp>
+        <p:nvSpPr>
+          <p:cNvPr id="3" name="Inhaltsplatzhalter 2"/>
+          <p:cNvSpPr>
+            <a:spLocks noGrp="1"/>
+          </p:cNvSpPr>
+          <p:nvPr>
+            <p:ph idx="1"/>
+          </p:nvPr>
+        </p:nvSpPr>
+        <p:spPr/>
+        <p:txBody>
+          <a:bodyPr/>
+          <a:lstStyle/>
+          <a:p>
+            <a:endParaRPr lang="de-CH" dirty="0"/>
+          </a:p>
+        </p:txBody>
+      </p:sp>
+      <p:pic>
+        <p:nvPicPr>
+          <p:cNvPr id="5" name="Grafik 4"/>
+          <p:cNvPicPr>
+            <a:picLocks noChangeAspect="1"/>
+          </p:cNvPicPr>
+          <p:nvPr/>
+        </p:nvPicPr>
+        <p:blipFill>
+          <a:blip r:embed="rId2"/>
+          <a:stretch>
+            <a:fillRect/>
+          </a:stretch>
+        </p:blipFill>
+        <p:spPr>
+          <a:xfrm>
+            <a:off x="1431476" y="1737361"/>
+            <a:ext cx="9104649" cy="3834328"/>
+          </a:xfrm>
+          <a:prstGeom prst="rect">
+            <a:avLst/>
+          </a:prstGeom>
+        </p:spPr>
+      </p:pic>
+    </p:spTree>
+    <p:extLst>
+      <p:ext uri="{BB962C8B-B14F-4D97-AF65-F5344CB8AC3E}">
+        <p14:creationId xmlns:p14="http://schemas.microsoft.com/office/powerpoint/2010/main" val="1736594440"/>
+      </p:ext>
+    </p:extLst>
+  </p:cSld>
+  <p:clrMapOvr>
+    <a:masterClrMapping/>
+  </p:clrMapOvr>
+</p:sld>
+</file>
+
+<file path=ppt/slides/slide17.xml><?xml version="1.0" encoding="utf-8"?>
+<p:sld xmlns:a="http://schemas.openxmlformats.org/drawingml/2006/main" xmlns:r="http://schemas.openxmlformats.org/officeDocument/2006/relationships" xmlns:p="http://schemas.openxmlformats.org/presentationml/2006/main">
+  <p:cSld>
+    <p:spTree>
+      <p:nvGrpSpPr>
+        <p:cNvPr id="1" name=""/>
+        <p:cNvGrpSpPr/>
+        <p:nvPr/>
+      </p:nvGrpSpPr>
+      <p:grpSpPr>
+        <a:xfrm>
+          <a:off x="0" y="0"/>
+          <a:ext cx="0" cy="0"/>
+          <a:chOff x="0" y="0"/>
+          <a:chExt cx="0" cy="0"/>
+        </a:xfrm>
+      </p:grpSpPr>
+      <p:sp>
+        <p:nvSpPr>
+          <p:cNvPr id="2" name="Titel 1"/>
+          <p:cNvSpPr>
+            <a:spLocks noGrp="1"/>
+          </p:cNvSpPr>
+          <p:nvPr>
+            <p:ph type="title"/>
+          </p:nvPr>
+        </p:nvSpPr>
+        <p:spPr/>
+        <p:txBody>
+          <a:bodyPr/>
+          <a:lstStyle/>
+          <a:p>
+            <a:r>
+              <a:rPr lang="de-CH" b="1" dirty="0" err="1"/>
+              <a:t>FreeRTOS</a:t>
+            </a:r>
+            <a:r>
+              <a:rPr lang="de-CH" dirty="0"/>
+              <a:t> </a:t>
+            </a:r>
+            <a:br>
+              <a:rPr lang="de-CH" dirty="0"/>
+            </a:br>
+            <a:r>
+              <a:rPr lang="de-CH" dirty="0"/>
+              <a:t>Task</a:t>
+            </a:r>
+            <a:endParaRPr lang="de-CH" dirty="0"/>
+          </a:p>
+        </p:txBody>
+      </p:sp>
+      <p:sp>
+        <p:nvSpPr>
+          <p:cNvPr id="3" name="Inhaltsplatzhalter 2"/>
+          <p:cNvSpPr>
+            <a:spLocks noGrp="1"/>
+          </p:cNvSpPr>
+          <p:nvPr>
+            <p:ph idx="1"/>
+          </p:nvPr>
+        </p:nvSpPr>
+        <p:spPr/>
+        <p:txBody>
+          <a:bodyPr/>
+          <a:lstStyle/>
+          <a:p>
+            <a:endParaRPr lang="de-CH" dirty="0"/>
+          </a:p>
+          <a:p>
+            <a:endParaRPr lang="de-CH" dirty="0"/>
+          </a:p>
+          <a:p>
+            <a:endParaRPr lang="de-CH" dirty="0"/>
+          </a:p>
+          <a:p>
+            <a:endParaRPr lang="de-CH" dirty="0"/>
+          </a:p>
+          <a:p>
+            <a:endParaRPr lang="de-CH" dirty="0"/>
+          </a:p>
+          <a:p>
+            <a:endParaRPr lang="de-CH" dirty="0"/>
+          </a:p>
+        </p:txBody>
+      </p:sp>
+      <p:pic>
+        <p:nvPicPr>
+          <p:cNvPr id="4" name="Grafik 3"/>
+          <p:cNvPicPr>
+            <a:picLocks noChangeAspect="1"/>
+          </p:cNvPicPr>
+          <p:nvPr/>
+        </p:nvPicPr>
+        <p:blipFill>
+          <a:blip r:embed="rId2"/>
+          <a:stretch>
+            <a:fillRect/>
+          </a:stretch>
+        </p:blipFill>
+        <p:spPr>
+          <a:xfrm>
+            <a:off x="901327" y="1676501"/>
+            <a:ext cx="10450306" cy="2846927"/>
+          </a:xfrm>
+          <a:prstGeom prst="rect">
+            <a:avLst/>
+          </a:prstGeom>
+        </p:spPr>
+      </p:pic>
+      <p:pic>
+        <p:nvPicPr>
+          <p:cNvPr id="5" name="Grafik 4"/>
+          <p:cNvPicPr>
+            <a:picLocks noChangeAspect="1"/>
+          </p:cNvPicPr>
+          <p:nvPr/>
+        </p:nvPicPr>
+        <p:blipFill>
+          <a:blip r:embed="rId3"/>
+          <a:stretch>
+            <a:fillRect/>
+          </a:stretch>
+        </p:blipFill>
+        <p:spPr>
+          <a:xfrm>
+            <a:off x="1097280" y="4972423"/>
+            <a:ext cx="9944100" cy="447675"/>
+          </a:xfrm>
+          <a:prstGeom prst="rect">
+            <a:avLst/>
+          </a:prstGeom>
+        </p:spPr>
+      </p:pic>
+    </p:spTree>
+    <p:extLst>
+      <p:ext uri="{BB962C8B-B14F-4D97-AF65-F5344CB8AC3E}">
+        <p14:creationId xmlns:p14="http://schemas.microsoft.com/office/powerpoint/2010/main" val="3944069364"/>
+      </p:ext>
+    </p:extLst>
+  </p:cSld>
+  <p:clrMapOvr>
+    <a:masterClrMapping/>
+  </p:clrMapOvr>
+  <p:timing>
+    <p:tnLst>
+      <p:par>
+        <p:cTn id="1" dur="indefinite" restart="never" nodeType="tmRoot">
+          <p:childTnLst>
+            <p:seq concurrent="1" nextAc="seek">
+              <p:cTn id="2" dur="indefinite" nodeType="mainSeq">
+                <p:childTnLst>
+                  <p:par>
+                    <p:cTn id="3" fill="hold">
+                      <p:stCondLst>
+                        <p:cond delay="indefinite"/>
+                      </p:stCondLst>
+                      <p:childTnLst>
+                        <p:par>
+                          <p:cTn id="4" fill="hold">
+                            <p:stCondLst>
+                              <p:cond delay="0"/>
+                            </p:stCondLst>
+                            <p:childTnLst>
+                              <p:par>
+                                <p:cTn id="5" presetID="1" presetClass="entr" presetSubtype="0" fill="hold" nodeType="clickEffect">
+                                  <p:stCondLst>
+                                    <p:cond delay="0"/>
+                                  </p:stCondLst>
+                                  <p:childTnLst>
+                                    <p:set>
+                                      <p:cBhvr>
+                                        <p:cTn id="6" dur="1" fill="hold">
+                                          <p:stCondLst>
+                                            <p:cond delay="0"/>
+                                          </p:stCondLst>
+                                        </p:cTn>
+                                        <p:tgtEl>
+                                          <p:spTgt spid="5"/>
+                                        </p:tgtEl>
+                                        <p:attrNameLst>
+                                          <p:attrName>style.visibility</p:attrName>
+                                        </p:attrNameLst>
+                                      </p:cBhvr>
+                                      <p:to>
+                                        <p:strVal val="visible"/>
+                                      </p:to>
+                                    </p:set>
+                                  </p:childTnLst>
+                                </p:cTn>
+                              </p:par>
+                            </p:childTnLst>
+                          </p:cTn>
+                        </p:par>
+                      </p:childTnLst>
+                    </p:cTn>
+                  </p:par>
+                </p:childTnLst>
+              </p:cTn>
+              <p:prevCondLst>
+                <p:cond evt="onPrev" delay="0">
+                  <p:tgtEl>
+                    <p:sldTgt/>
+                  </p:tgtEl>
+                </p:cond>
+              </p:prevCondLst>
+              <p:nextCondLst>
+                <p:cond evt="onNext" delay="0">
+                  <p:tgtEl>
+                    <p:sldTgt/>
+                  </p:tgtEl>
+                </p:cond>
+              </p:nextCondLst>
+            </p:seq>
+          </p:childTnLst>
+        </p:cTn>
+      </p:par>
+    </p:tnLst>
+  </p:timing>
+</p:sld>
+</file>
+
+<file path=ppt/slides/slide18.xml><?xml version="1.0" encoding="utf-8"?>
+<p:sld xmlns:a="http://schemas.openxmlformats.org/drawingml/2006/main" xmlns:r="http://schemas.openxmlformats.org/officeDocument/2006/relationships" xmlns:p="http://schemas.openxmlformats.org/presentationml/2006/main">
+  <p:cSld>
+    <p:spTree>
+      <p:nvGrpSpPr>
+        <p:cNvPr id="1" name=""/>
+        <p:cNvGrpSpPr/>
+        <p:nvPr/>
+      </p:nvGrpSpPr>
+      <p:grpSpPr>
+        <a:xfrm>
+          <a:off x="0" y="0"/>
+          <a:ext cx="0" cy="0"/>
+          <a:chOff x="0" y="0"/>
+          <a:chExt cx="0" cy="0"/>
+        </a:xfrm>
+      </p:grpSpPr>
+      <p:sp>
+        <p:nvSpPr>
+          <p:cNvPr id="2" name="Titel 1"/>
+          <p:cNvSpPr>
+            <a:spLocks noGrp="1"/>
+          </p:cNvSpPr>
+          <p:nvPr>
+            <p:ph type="title"/>
+          </p:nvPr>
+        </p:nvSpPr>
+        <p:spPr/>
+        <p:txBody>
+          <a:bodyPr/>
+          <a:lstStyle/>
+          <a:p>
             <a:r>
               <a:rPr lang="en-CA" dirty="0"/>
-              <a:t>:</a:t>
+              <a:t>Questions:</a:t>
             </a:r>
             <a:endParaRPr lang="de-CH" dirty="0"/>
           </a:p>
@@ -5120,6 +5465,112 @@
               </a:rPr>
               <a:t>. </a:t>
             </a:r>
+          </a:p>
+          <a:p>
+            <a:pPr marL="0" indent="0">
+              <a:buNone/>
+            </a:pPr>
+            <a:endParaRPr lang="en-CA" dirty="0">
+              <a:sym typeface="Wingdings" panose="05000000000000000000" pitchFamily="2" charset="2"/>
+            </a:endParaRPr>
+          </a:p>
+          <a:p>
+            <a:pPr marL="0" indent="0">
+              <a:buNone/>
+            </a:pPr>
+            <a:endParaRPr lang="en-CA" dirty="0">
+              <a:sym typeface="Wingdings" panose="05000000000000000000" pitchFamily="2" charset="2"/>
+            </a:endParaRPr>
+          </a:p>
+          <a:p>
+            <a:pPr marL="0" indent="0">
+              <a:buNone/>
+            </a:pPr>
+            <a:r>
+              <a:rPr lang="en-CA" dirty="0">
+                <a:sym typeface="Wingdings" panose="05000000000000000000" pitchFamily="2" charset="2"/>
+              </a:rPr>
+              <a:t>What is </a:t>
+            </a:r>
+            <a:r>
+              <a:rPr lang="de-CH" dirty="0" err="1"/>
+              <a:t>Preemptive</a:t>
+            </a:r>
+            <a:r>
+              <a:rPr lang="de-CH" dirty="0"/>
+              <a:t> </a:t>
+            </a:r>
+            <a:r>
+              <a:rPr lang="de-CH" dirty="0" err="1"/>
+              <a:t>Scheduling</a:t>
+            </a:r>
+            <a:r>
+              <a:rPr lang="de-CH" dirty="0"/>
+              <a:t>?</a:t>
+            </a:r>
+          </a:p>
+          <a:p>
+            <a:pPr marL="0" indent="0">
+              <a:buNone/>
+            </a:pPr>
+            <a:r>
+              <a:rPr lang="en-US" dirty="0"/>
+              <a:t>Multiple tasks with the same priority: time-slicing</a:t>
+            </a:r>
+          </a:p>
+          <a:p>
+            <a:pPr marL="0" indent="0">
+              <a:buNone/>
+            </a:pPr>
+            <a:r>
+              <a:rPr lang="en-US" dirty="0"/>
+              <a:t>Always run the highest-priority ready task</a:t>
+            </a:r>
+          </a:p>
+          <a:p>
+            <a:pPr marL="0" indent="0">
+              <a:buNone/>
+            </a:pPr>
+            <a:endParaRPr lang="en-US" dirty="0"/>
+          </a:p>
+          <a:p>
+            <a:pPr marL="0" indent="0">
+              <a:buNone/>
+            </a:pPr>
+            <a:endParaRPr lang="de-CH" b="1" dirty="0"/>
+          </a:p>
+          <a:p>
+            <a:pPr marL="0" indent="0">
+              <a:buNone/>
+            </a:pPr>
+            <a:endParaRPr lang="de-CH" b="1" dirty="0"/>
+          </a:p>
+          <a:p>
+            <a:pPr marL="0" indent="0">
+              <a:buNone/>
+            </a:pPr>
+            <a:endParaRPr lang="de-CH" dirty="0"/>
+          </a:p>
+          <a:p>
+            <a:pPr marL="0" indent="0">
+              <a:buNone/>
+            </a:pPr>
+            <a:endParaRPr lang="en-CA" dirty="0">
+              <a:sym typeface="Wingdings" panose="05000000000000000000" pitchFamily="2" charset="2"/>
+            </a:endParaRPr>
+          </a:p>
+          <a:p>
+            <a:pPr marL="0" indent="0">
+              <a:buNone/>
+            </a:pPr>
+            <a:endParaRPr lang="en-CA" dirty="0">
+              <a:sym typeface="Wingdings" panose="05000000000000000000" pitchFamily="2" charset="2"/>
+            </a:endParaRPr>
+          </a:p>
+          <a:p>
+            <a:pPr marL="0" indent="0">
+              <a:buNone/>
+            </a:pPr>
             <a:endParaRPr lang="de-CH" dirty="0"/>
           </a:p>
         </p:txBody>
@@ -5128,6 +5579,94 @@
     <p:extLst>
       <p:ext uri="{BB962C8B-B14F-4D97-AF65-F5344CB8AC3E}">
         <p14:creationId xmlns:p14="http://schemas.microsoft.com/office/powerpoint/2010/main" val="2611258350"/>
+      </p:ext>
+    </p:extLst>
+  </p:cSld>
+  <p:clrMapOvr>
+    <a:masterClrMapping/>
+  </p:clrMapOvr>
+</p:sld>
+</file>
+
+<file path=ppt/slides/slide19.xml><?xml version="1.0" encoding="utf-8"?>
+<p:sld xmlns:a="http://schemas.openxmlformats.org/drawingml/2006/main" xmlns:r="http://schemas.openxmlformats.org/officeDocument/2006/relationships" xmlns:p="http://schemas.openxmlformats.org/presentationml/2006/main">
+  <p:cSld>
+    <p:spTree>
+      <p:nvGrpSpPr>
+        <p:cNvPr id="1" name=""/>
+        <p:cNvGrpSpPr/>
+        <p:nvPr/>
+      </p:nvGrpSpPr>
+      <p:grpSpPr>
+        <a:xfrm>
+          <a:off x="0" y="0"/>
+          <a:ext cx="0" cy="0"/>
+          <a:chOff x="0" y="0"/>
+          <a:chExt cx="0" cy="0"/>
+        </a:xfrm>
+      </p:grpSpPr>
+      <p:sp>
+        <p:nvSpPr>
+          <p:cNvPr id="2" name="Titel 1"/>
+          <p:cNvSpPr>
+            <a:spLocks noGrp="1"/>
+          </p:cNvSpPr>
+          <p:nvPr>
+            <p:ph type="title"/>
+          </p:nvPr>
+        </p:nvSpPr>
+        <p:spPr/>
+        <p:txBody>
+          <a:bodyPr/>
+          <a:lstStyle/>
+          <a:p>
+            <a:endParaRPr lang="de-CH"/>
+          </a:p>
+        </p:txBody>
+      </p:sp>
+      <p:sp>
+        <p:nvSpPr>
+          <p:cNvPr id="3" name="Inhaltsplatzhalter 2"/>
+          <p:cNvSpPr>
+            <a:spLocks noGrp="1"/>
+          </p:cNvSpPr>
+          <p:nvPr>
+            <p:ph idx="1"/>
+          </p:nvPr>
+        </p:nvSpPr>
+        <p:spPr/>
+        <p:txBody>
+          <a:bodyPr/>
+          <a:lstStyle/>
+          <a:p>
+            <a:r>
+              <a:rPr lang="en-US" dirty="0"/>
+              <a:t>How can you force a context switch ( switch Task )?</a:t>
+            </a:r>
+          </a:p>
+          <a:p>
+            <a:r>
+              <a:rPr lang="en-US"/>
+              <a:t>t</a:t>
+            </a:r>
+            <a:r>
+              <a:rPr lang="en-US"/>
+              <a:t>askYield</a:t>
+            </a:r>
+            <a:endParaRPr lang="en-US" dirty="0"/>
+          </a:p>
+          <a:p>
+            <a:endParaRPr lang="en-US" dirty="0"/>
+          </a:p>
+          <a:p>
+            <a:endParaRPr lang="de-CH" dirty="0"/>
+          </a:p>
+        </p:txBody>
+      </p:sp>
+    </p:spTree>
+    <p:extLst>
+      <p:ext uri="{BB962C8B-B14F-4D97-AF65-F5344CB8AC3E}">
+        <p14:creationId xmlns:p14="http://schemas.microsoft.com/office/powerpoint/2010/main" val="1165061231"/>
       </p:ext>
     </p:extLst>
   </p:cSld>

</xml_diff>

<commit_message>
added information and questions to presentation
</commit_message>
<xml_diff>
--- a/Recap_SW5_Ineichen_Stecher.pptx
+++ b/Recap_SW5_Ineichen_Stecher.pptx
@@ -7,8 +7,8 @@
   <p:sldIdLst>
     <p:sldId id="256" r:id="rId2"/>
     <p:sldId id="257" r:id="rId3"/>
-    <p:sldId id="258" r:id="rId4"/>
-    <p:sldId id="270" r:id="rId5"/>
+    <p:sldId id="270" r:id="rId4"/>
+    <p:sldId id="258" r:id="rId5"/>
     <p:sldId id="259" r:id="rId6"/>
     <p:sldId id="261" r:id="rId7"/>
     <p:sldId id="262" r:id="rId8"/>
@@ -5091,7 +5091,6 @@
               <a:rPr lang="de-CH" dirty="0"/>
               <a:t>Task</a:t>
             </a:r>
-            <a:endParaRPr lang="de-CH" dirty="0"/>
           </a:p>
         </p:txBody>
       </p:sp>
@@ -5324,147 +5323,54 @@
               <a:buNone/>
             </a:pPr>
             <a:r>
-              <a:rPr lang="en-CA" dirty="0"/>
-              <a:t>PREN </a:t>
-            </a:r>
-            <a:r>
               <a:rPr lang="en-CA" dirty="0">
                 <a:sym typeface="Wingdings" panose="05000000000000000000" pitchFamily="2" charset="2"/>
               </a:rPr>
-              <a:t> </a:t>
+              <a:t>What are Pros and Cons for using in PREN an RTOS?</a:t>
+            </a:r>
+          </a:p>
+          <a:p>
+            <a:pPr marL="0" indent="0">
+              <a:buNone/>
+            </a:pPr>
+            <a:r>
+              <a:rPr lang="en-CA" dirty="0">
+                <a:sym typeface="Wingdings" panose="05000000000000000000" pitchFamily="2" charset="2"/>
+              </a:rPr>
+              <a:t>+ Quasi-concurrent, </a:t>
             </a:r>
             <a:r>
               <a:rPr lang="en-CA" dirty="0" err="1">
                 <a:sym typeface="Wingdings" panose="05000000000000000000" pitchFamily="2" charset="2"/>
               </a:rPr>
-              <a:t>wieso</a:t>
+              <a:t>Priorityhandling</a:t>
             </a:r>
             <a:r>
               <a:rPr lang="en-CA" dirty="0">
                 <a:sym typeface="Wingdings" panose="05000000000000000000" pitchFamily="2" charset="2"/>
               </a:rPr>
-              <a:t> </a:t>
-            </a:r>
-            <a:r>
-              <a:rPr lang="en-CA" dirty="0" err="1">
-                <a:sym typeface="Wingdings" panose="05000000000000000000" pitchFamily="2" charset="2"/>
-              </a:rPr>
-              <a:t>sollte</a:t>
-            </a:r>
+              <a:t> with Tasks with ISR</a:t>
+            </a:r>
+          </a:p>
+          <a:p>
+            <a:pPr marL="0" indent="0">
+              <a:buNone/>
+            </a:pPr>
             <a:r>
               <a:rPr lang="en-CA" dirty="0">
                 <a:sym typeface="Wingdings" panose="05000000000000000000" pitchFamily="2" charset="2"/>
               </a:rPr>
-              <a:t> </a:t>
-            </a:r>
-            <a:r>
-              <a:rPr lang="en-CA" dirty="0" err="1">
+              <a:t>- Controller needed, Memory for </a:t>
+            </a:r>
+            <a:r>
+              <a:rPr lang="en-CA">
                 <a:sym typeface="Wingdings" panose="05000000000000000000" pitchFamily="2" charset="2"/>
               </a:rPr>
-              <a:t>ein</a:t>
-            </a:r>
-            <a:r>
-              <a:rPr lang="en-CA" dirty="0">
-                <a:sym typeface="Wingdings" panose="05000000000000000000" pitchFamily="2" charset="2"/>
-              </a:rPr>
-              <a:t> OS </a:t>
-            </a:r>
-            <a:r>
-              <a:rPr lang="en-CA" dirty="0" err="1">
-                <a:sym typeface="Wingdings" panose="05000000000000000000" pitchFamily="2" charset="2"/>
-              </a:rPr>
-              <a:t>oder</a:t>
-            </a:r>
-            <a:r>
-              <a:rPr lang="en-CA" dirty="0">
-                <a:sym typeface="Wingdings" panose="05000000000000000000" pitchFamily="2" charset="2"/>
-              </a:rPr>
-              <a:t> </a:t>
-            </a:r>
-            <a:r>
-              <a:rPr lang="en-CA" dirty="0" err="1">
-                <a:sym typeface="Wingdings" panose="05000000000000000000" pitchFamily="2" charset="2"/>
-              </a:rPr>
-              <a:t>wiso</a:t>
-            </a:r>
-            <a:r>
-              <a:rPr lang="en-CA" dirty="0">
-                <a:sym typeface="Wingdings" panose="05000000000000000000" pitchFamily="2" charset="2"/>
-              </a:rPr>
-              <a:t> </a:t>
-            </a:r>
-            <a:r>
-              <a:rPr lang="en-CA" dirty="0" err="1">
-                <a:sym typeface="Wingdings" panose="05000000000000000000" pitchFamily="2" charset="2"/>
-              </a:rPr>
-              <a:t>sollte</a:t>
-            </a:r>
-            <a:r>
-              <a:rPr lang="en-CA" dirty="0">
-                <a:sym typeface="Wingdings" panose="05000000000000000000" pitchFamily="2" charset="2"/>
-              </a:rPr>
-              <a:t> </a:t>
-            </a:r>
-            <a:r>
-              <a:rPr lang="en-CA" dirty="0" err="1">
-                <a:sym typeface="Wingdings" panose="05000000000000000000" pitchFamily="2" charset="2"/>
-              </a:rPr>
-              <a:t>ein</a:t>
-            </a:r>
-            <a:r>
-              <a:rPr lang="en-CA" dirty="0">
-                <a:sym typeface="Wingdings" panose="05000000000000000000" pitchFamily="2" charset="2"/>
-              </a:rPr>
-              <a:t> RTOS </a:t>
-            </a:r>
-            <a:r>
-              <a:rPr lang="en-CA" dirty="0" err="1">
-                <a:sym typeface="Wingdings" panose="05000000000000000000" pitchFamily="2" charset="2"/>
-              </a:rPr>
-              <a:t>verwendet</a:t>
-            </a:r>
-            <a:r>
-              <a:rPr lang="en-CA" dirty="0">
-                <a:sym typeface="Wingdings" panose="05000000000000000000" pitchFamily="2" charset="2"/>
-              </a:rPr>
-              <a:t> warden? Was </a:t>
-            </a:r>
-            <a:r>
-              <a:rPr lang="en-CA" dirty="0" err="1">
-                <a:sym typeface="Wingdings" panose="05000000000000000000" pitchFamily="2" charset="2"/>
-              </a:rPr>
-              <a:t>spricht</a:t>
-            </a:r>
-            <a:r>
-              <a:rPr lang="en-CA" dirty="0">
-                <a:sym typeface="Wingdings" panose="05000000000000000000" pitchFamily="2" charset="2"/>
-              </a:rPr>
-              <a:t> </a:t>
-            </a:r>
-            <a:r>
-              <a:rPr lang="en-CA" dirty="0" err="1">
-                <a:sym typeface="Wingdings" panose="05000000000000000000" pitchFamily="2" charset="2"/>
-              </a:rPr>
-              <a:t>dagegen</a:t>
-            </a:r>
-            <a:r>
-              <a:rPr lang="en-CA" dirty="0">
-                <a:sym typeface="Wingdings" panose="05000000000000000000" pitchFamily="2" charset="2"/>
-              </a:rPr>
-              <a:t> was </a:t>
-            </a:r>
-            <a:r>
-              <a:rPr lang="en-CA" dirty="0" err="1">
-                <a:sym typeface="Wingdings" panose="05000000000000000000" pitchFamily="2" charset="2"/>
-              </a:rPr>
-              <a:t>dafür</a:t>
-            </a:r>
-            <a:r>
-              <a:rPr lang="en-CA" dirty="0">
-                <a:sym typeface="Wingdings" panose="05000000000000000000" pitchFamily="2" charset="2"/>
-              </a:rPr>
-              <a:t>. </a:t>
-            </a:r>
+              <a:t>OS ??</a:t>
+            </a:r>
+            <a:endParaRPr lang="en-CA" dirty="0">
+              <a:sym typeface="Wingdings" panose="05000000000000000000" pitchFamily="2" charset="2"/>
+            </a:endParaRPr>
           </a:p>
           <a:p>
             <a:pPr marL="0" indent="0">
@@ -5646,17 +5552,40 @@
           </a:p>
           <a:p>
             <a:r>
-              <a:rPr lang="en-US"/>
-              <a:t>t</a:t>
-            </a:r>
-            <a:r>
-              <a:rPr lang="en-US"/>
-              <a:t>askYield</a:t>
+              <a:rPr lang="en-US" dirty="0" err="1"/>
+              <a:t>taskYield</a:t>
             </a:r>
             <a:endParaRPr lang="en-US" dirty="0"/>
           </a:p>
           <a:p>
             <a:endParaRPr lang="en-US" dirty="0"/>
+          </a:p>
+          <a:p>
+            <a:r>
+              <a:rPr lang="en-US" dirty="0"/>
+              <a:t>In which modes can the Scheduler put the Tasks?</a:t>
+            </a:r>
+          </a:p>
+          <a:p>
+            <a:r>
+              <a:rPr lang="en-US" dirty="0"/>
+              <a:t>Tick, Wait(), Yield(), Synch() </a:t>
+            </a:r>
+          </a:p>
+          <a:p>
+            <a:endParaRPr lang="en-US" dirty="0"/>
+          </a:p>
+          <a:p>
+            <a:r>
+              <a:rPr lang="en-US" dirty="0"/>
+              <a:t>How can a Task be destroyed?</a:t>
+            </a:r>
+          </a:p>
+          <a:p>
+            <a:r>
+              <a:rPr lang="en-US" dirty="0"/>
+              <a:t>It can’t. I can only be suspended</a:t>
+            </a:r>
           </a:p>
           <a:p>
             <a:endParaRPr lang="de-CH" dirty="0"/>
@@ -5705,16 +5634,24 @@
         </p:nvSpPr>
         <p:spPr/>
         <p:txBody>
-          <a:bodyPr/>
-          <a:lstStyle/>
-          <a:p>
-            <a:r>
-              <a:rPr lang="en-CA" dirty="0" err="1"/>
-              <a:t>Wieso</a:t>
-            </a:r>
-            <a:r>
+          <a:bodyPr>
+            <a:normAutofit fontScale="90000"/>
+          </a:bodyPr>
+          <a:lstStyle/>
+          <a:p>
+            <a:br>
               <a:rPr lang="en-CA" dirty="0"/>
-              <a:t> RTOS?</a:t>
+            </a:br>
+            <a:r>
+              <a:rPr lang="de-CH" b="1" dirty="0"/>
+              <a:t>RTOS</a:t>
+            </a:r>
+            <a:br>
+              <a:rPr lang="de-CH" b="1" dirty="0"/>
+            </a:br>
+            <a:r>
+              <a:rPr lang="en-CA" dirty="0"/>
+              <a:t>Why RTOS?</a:t>
             </a:r>
             <a:endParaRPr lang="de-CH" dirty="0"/>
           </a:p>
@@ -5730,52 +5667,46 @@
             <p:ph idx="1"/>
           </p:nvPr>
         </p:nvSpPr>
-        <p:spPr/>
+        <p:spPr>
+          <a:xfrm>
+            <a:off x="1097279" y="1845734"/>
+            <a:ext cx="10411852" cy="4023360"/>
+          </a:xfrm>
+        </p:spPr>
         <p:txBody>
           <a:bodyPr/>
           <a:lstStyle/>
           <a:p>
             <a:r>
               <a:rPr lang="en-CA" dirty="0"/>
-              <a:t>Synchronisation</a:t>
-            </a:r>
-          </a:p>
-          <a:p>
-            <a:r>
-              <a:rPr lang="en-CA" dirty="0" err="1"/>
-              <a:t>Quasigleichzeitig</a:t>
-            </a:r>
+              <a:t>Solves synchronization problems</a:t>
+            </a:r>
+          </a:p>
+          <a:p>
             <a:r>
               <a:rPr lang="en-CA" dirty="0"/>
-              <a:t> </a:t>
-            </a:r>
-          </a:p>
-          <a:p>
-            <a:r>
-              <a:rPr lang="en-CA" dirty="0" err="1"/>
-              <a:t>Hardwarenahe</a:t>
-            </a:r>
+              <a:t>Quasi-concurrent execution of services </a:t>
+            </a:r>
+          </a:p>
+          <a:p>
             <a:r>
               <a:rPr lang="en-CA" dirty="0"/>
-              <a:t> </a:t>
+              <a:t>Close to Hardware </a:t>
             </a:r>
             <a:r>
               <a:rPr lang="en-CA" dirty="0">
                 <a:sym typeface="Wingdings" panose="05000000000000000000" pitchFamily="2" charset="2"/>
               </a:rPr>
-              <a:t> </a:t>
-            </a:r>
-            <a:r>
-              <a:rPr lang="en-CA" dirty="0" err="1">
-                <a:sym typeface="Wingdings" panose="05000000000000000000" pitchFamily="2" charset="2"/>
-              </a:rPr>
-              <a:t>bessere</a:t>
-            </a:r>
+              <a:t> better performance</a:t>
+            </a:r>
+          </a:p>
+          <a:p>
+            <a:pPr lvl="1"/>
             <a:r>
               <a:rPr lang="en-CA" dirty="0">
                 <a:sym typeface="Wingdings" panose="05000000000000000000" pitchFamily="2" charset="2"/>
               </a:rPr>
-              <a:t> Performance</a:t>
+              <a:t>OS needs Driver</a:t>
             </a:r>
           </a:p>
           <a:p>
@@ -5784,101 +5715,27 @@
               <a:rPr lang="en-CA" dirty="0">
                 <a:sym typeface="Wingdings" panose="05000000000000000000" pitchFamily="2" charset="2"/>
               </a:rPr>
-              <a:t>OS </a:t>
-            </a:r>
-            <a:r>
-              <a:rPr lang="en-CA" dirty="0" err="1">
+              <a:t>RTOS direct connected</a:t>
+            </a:r>
+          </a:p>
+          <a:p>
+            <a:pPr marL="292608" lvl="1">
+              <a:buNone/>
+            </a:pPr>
+            <a:r>
+              <a:rPr lang="en-CA" sz="2000" dirty="0">
                 <a:sym typeface="Wingdings" panose="05000000000000000000" pitchFamily="2" charset="2"/>
               </a:rPr>
-              <a:t>würde</a:t>
-            </a:r>
+              <a:t>Correct Result at correct time, independent of System load, in a deterministic and foreseeable way</a:t>
+            </a:r>
+          </a:p>
+          <a:p>
             <a:r>
               <a:rPr lang="en-CA" dirty="0">
                 <a:sym typeface="Wingdings" panose="05000000000000000000" pitchFamily="2" charset="2"/>
               </a:rPr>
-              <a:t> </a:t>
-            </a:r>
-            <a:r>
-              <a:rPr lang="en-CA" dirty="0" err="1">
-                <a:sym typeface="Wingdings" panose="05000000000000000000" pitchFamily="2" charset="2"/>
-              </a:rPr>
-              <a:t>Treiber</a:t>
-            </a:r>
-            <a:r>
-              <a:rPr lang="en-CA" dirty="0">
-                <a:sym typeface="Wingdings" panose="05000000000000000000" pitchFamily="2" charset="2"/>
-              </a:rPr>
-              <a:t> </a:t>
-            </a:r>
-            <a:r>
-              <a:rPr lang="en-CA" dirty="0" err="1">
-                <a:sym typeface="Wingdings" panose="05000000000000000000" pitchFamily="2" charset="2"/>
-              </a:rPr>
-              <a:t>benötigen</a:t>
-            </a:r>
-            <a:endParaRPr lang="en-CA" dirty="0">
-              <a:sym typeface="Wingdings" panose="05000000000000000000" pitchFamily="2" charset="2"/>
-            </a:endParaRPr>
-          </a:p>
-          <a:p>
-            <a:pPr lvl="1"/>
-            <a:r>
-              <a:rPr lang="en-CA" dirty="0">
-                <a:sym typeface="Wingdings" panose="05000000000000000000" pitchFamily="2" charset="2"/>
-              </a:rPr>
-              <a:t>RTOS </a:t>
-            </a:r>
-            <a:r>
-              <a:rPr lang="en-CA" dirty="0" err="1">
-                <a:sym typeface="Wingdings" panose="05000000000000000000" pitchFamily="2" charset="2"/>
-              </a:rPr>
-              <a:t>direkt</a:t>
-            </a:r>
-            <a:r>
-              <a:rPr lang="en-CA" dirty="0">
-                <a:sym typeface="Wingdings" panose="05000000000000000000" pitchFamily="2" charset="2"/>
-              </a:rPr>
-              <a:t> </a:t>
-            </a:r>
-            <a:r>
-              <a:rPr lang="en-CA" dirty="0" err="1">
-                <a:sym typeface="Wingdings" panose="05000000000000000000" pitchFamily="2" charset="2"/>
-              </a:rPr>
-              <a:t>mit</a:t>
-            </a:r>
-            <a:r>
-              <a:rPr lang="en-CA" dirty="0">
-                <a:sym typeface="Wingdings" panose="05000000000000000000" pitchFamily="2" charset="2"/>
-              </a:rPr>
-              <a:t> Hardware</a:t>
-            </a:r>
-          </a:p>
-          <a:p>
-            <a:r>
-              <a:rPr lang="en-CA" dirty="0">
-                <a:sym typeface="Wingdings" panose="05000000000000000000" pitchFamily="2" charset="2"/>
-              </a:rPr>
-              <a:t>Low Power und </a:t>
-            </a:r>
-            <a:r>
-              <a:rPr lang="en-CA" dirty="0" err="1">
-                <a:sym typeface="Wingdings" panose="05000000000000000000" pitchFamily="2" charset="2"/>
-              </a:rPr>
-              <a:t>geringe</a:t>
-            </a:r>
-            <a:r>
-              <a:rPr lang="en-CA" dirty="0">
-                <a:sym typeface="Wingdings" panose="05000000000000000000" pitchFamily="2" charset="2"/>
-              </a:rPr>
-              <a:t> </a:t>
-            </a:r>
-            <a:r>
-              <a:rPr lang="en-CA" dirty="0" err="1">
-                <a:sym typeface="Wingdings" panose="05000000000000000000" pitchFamily="2" charset="2"/>
-              </a:rPr>
-              <a:t>Bootzeit</a:t>
-            </a:r>
-            <a:endParaRPr lang="en-CA" dirty="0"/>
+              <a:t>Requirements for standard OS and RTOS are different</a:t>
+            </a:r>
           </a:p>
           <a:p>
             <a:endParaRPr lang="de-CH" dirty="0"/>
@@ -5931,10 +5788,20 @@
           <a:lstStyle/>
           <a:p>
             <a:r>
-              <a:rPr lang="en-CA" dirty="0"/>
-              <a:t>Scheduler</a:t>
-            </a:r>
-            <a:endParaRPr lang="de-CH" dirty="0"/>
+              <a:rPr lang="de-CH" b="1" dirty="0"/>
+              <a:t>RTOS</a:t>
+            </a:r>
+            <a:r>
+              <a:rPr lang="de-CH" dirty="0"/>
+              <a:t> </a:t>
+            </a:r>
+            <a:br>
+              <a:rPr lang="de-CH" dirty="0"/>
+            </a:br>
+            <a:r>
+              <a:rPr lang="de-CH" dirty="0"/>
+              <a:t>Kernel</a:t>
+            </a:r>
           </a:p>
         </p:txBody>
       </p:sp>
@@ -5956,18 +5823,100 @@
         </p:blipFill>
         <p:spPr>
           <a:xfrm>
-            <a:off x="1815420" y="2036024"/>
-            <a:ext cx="8505317" cy="3817902"/>
+            <a:off x="4200964" y="1919348"/>
+            <a:ext cx="7784263" cy="3856314"/>
           </a:xfrm>
           <a:prstGeom prst="rect">
             <a:avLst/>
           </a:prstGeom>
         </p:spPr>
       </p:pic>
+      <p:sp>
+        <p:nvSpPr>
+          <p:cNvPr id="5" name="Textfeld 4"/>
+          <p:cNvSpPr txBox="1"/>
+          <p:nvPr/>
+        </p:nvSpPr>
+        <p:spPr>
+          <a:xfrm>
+            <a:off x="805063" y="2338754"/>
+            <a:ext cx="4225580" cy="923330"/>
+          </a:xfrm>
+          <a:prstGeom prst="rect">
+            <a:avLst/>
+          </a:prstGeom>
+          <a:noFill/>
+        </p:spPr>
+        <p:txBody>
+          <a:bodyPr wrap="none" rtlCol="0">
+            <a:spAutoFit/>
+          </a:bodyPr>
+          <a:lstStyle/>
+          <a:p>
+            <a:pPr marL="285750" indent="-285750">
+              <a:buFont typeface="Arial" panose="020B0604020202020204" pitchFamily="34" charset="0"/>
+              <a:buChar char="•"/>
+            </a:pPr>
+            <a:r>
+              <a:rPr lang="en-CA" dirty="0">
+                <a:solidFill>
+                  <a:schemeClr val="tx1">
+                    <a:lumMod val="75000"/>
+                    <a:lumOff val="25000"/>
+                  </a:schemeClr>
+                </a:solidFill>
+              </a:rPr>
+              <a:t>Catching Interrupts</a:t>
+            </a:r>
+          </a:p>
+          <a:p>
+            <a:pPr marL="285750" indent="-285750">
+              <a:buFont typeface="Arial" panose="020B0604020202020204" pitchFamily="34" charset="0"/>
+              <a:buChar char="•"/>
+            </a:pPr>
+            <a:r>
+              <a:rPr lang="en-CA" dirty="0">
+                <a:solidFill>
+                  <a:schemeClr val="tx1">
+                    <a:lumMod val="75000"/>
+                    <a:lumOff val="25000"/>
+                  </a:schemeClr>
+                </a:solidFill>
+              </a:rPr>
+              <a:t>Time base (Timer/Tick Interrupt)</a:t>
+            </a:r>
+          </a:p>
+          <a:p>
+            <a:pPr marL="285750" indent="-285750">
+              <a:buFont typeface="Arial" panose="020B0604020202020204" pitchFamily="34" charset="0"/>
+              <a:buChar char="•"/>
+            </a:pPr>
+            <a:r>
+              <a:rPr lang="en-CA" dirty="0">
+                <a:solidFill>
+                  <a:schemeClr val="tx1">
+                    <a:lumMod val="75000"/>
+                    <a:lumOff val="25000"/>
+                  </a:schemeClr>
+                </a:solidFill>
+              </a:rPr>
+              <a:t>System Call and Traps (Trigger Interrupt)</a:t>
+            </a:r>
+            <a:endParaRPr lang="de-CH" dirty="0">
+              <a:solidFill>
+                <a:schemeClr val="tx1">
+                  <a:lumMod val="75000"/>
+                  <a:lumOff val="25000"/>
+                </a:schemeClr>
+              </a:solidFill>
+            </a:endParaRPr>
+          </a:p>
+        </p:txBody>
+      </p:sp>
     </p:spTree>
     <p:extLst>
       <p:ext uri="{BB962C8B-B14F-4D97-AF65-F5344CB8AC3E}">
-        <p14:creationId xmlns:p14="http://schemas.microsoft.com/office/powerpoint/2010/main" val="1916690929"/>
+        <p14:creationId xmlns:p14="http://schemas.microsoft.com/office/powerpoint/2010/main" val="4092189812"/>
       </p:ext>
     </p:extLst>
   </p:cSld>
@@ -6010,9 +5959,17 @@
           <a:lstStyle/>
           <a:p>
             <a:r>
-              <a:rPr lang="de-CH" dirty="0"/>
-              <a:t>RTOS Kernel</a:t>
-            </a:r>
+              <a:rPr lang="de-CH" b="1" dirty="0"/>
+              <a:t>RTOS</a:t>
+            </a:r>
+            <a:br>
+              <a:rPr lang="de-CH" b="1" dirty="0"/>
+            </a:br>
+            <a:r>
+              <a:rPr lang="en-CA" dirty="0"/>
+              <a:t>Scheduler</a:t>
+            </a:r>
+            <a:endParaRPr lang="de-CH" dirty="0"/>
           </a:p>
         </p:txBody>
       </p:sp>
@@ -6034,18 +5991,100 @@
         </p:blipFill>
         <p:spPr>
           <a:xfrm>
-            <a:off x="2078691" y="2007271"/>
-            <a:ext cx="7784263" cy="3856314"/>
+            <a:off x="3143058" y="1930516"/>
+            <a:ext cx="8505317" cy="3817902"/>
           </a:xfrm>
           <a:prstGeom prst="rect">
             <a:avLst/>
           </a:prstGeom>
         </p:spPr>
       </p:pic>
+      <p:sp>
+        <p:nvSpPr>
+          <p:cNvPr id="5" name="Textfeld 4"/>
+          <p:cNvSpPr txBox="1"/>
+          <p:nvPr/>
+        </p:nvSpPr>
+        <p:spPr>
+          <a:xfrm>
+            <a:off x="1030268" y="2022231"/>
+            <a:ext cx="4386137" cy="923330"/>
+          </a:xfrm>
+          <a:prstGeom prst="rect">
+            <a:avLst/>
+          </a:prstGeom>
+          <a:noFill/>
+        </p:spPr>
+        <p:txBody>
+          <a:bodyPr wrap="none" rtlCol="0">
+            <a:spAutoFit/>
+          </a:bodyPr>
+          <a:lstStyle/>
+          <a:p>
+            <a:pPr marL="285750" indent="-285750">
+              <a:buFont typeface="Arial" panose="020B0604020202020204" pitchFamily="34" charset="0"/>
+              <a:buChar char="•"/>
+            </a:pPr>
+            <a:r>
+              <a:rPr lang="en-CA" dirty="0">
+                <a:solidFill>
+                  <a:schemeClr val="tx1">
+                    <a:lumMod val="75000"/>
+                    <a:lumOff val="25000"/>
+                  </a:schemeClr>
+                </a:solidFill>
+              </a:rPr>
+              <a:t>Tick passes control to scheduler</a:t>
+            </a:r>
+          </a:p>
+          <a:p>
+            <a:pPr marL="285750" indent="-285750">
+              <a:buFont typeface="Arial" panose="020B0604020202020204" pitchFamily="34" charset="0"/>
+              <a:buChar char="•"/>
+            </a:pPr>
+            <a:r>
+              <a:rPr lang="en-CA" dirty="0">
+                <a:solidFill>
+                  <a:schemeClr val="tx1">
+                    <a:lumMod val="75000"/>
+                    <a:lumOff val="25000"/>
+                  </a:schemeClr>
+                </a:solidFill>
+              </a:rPr>
+              <a:t>Scheduler can schedule other Task</a:t>
+            </a:r>
+          </a:p>
+          <a:p>
+            <a:pPr marL="285750" indent="-285750">
+              <a:buFont typeface="Arial" panose="020B0604020202020204" pitchFamily="34" charset="0"/>
+              <a:buChar char="•"/>
+            </a:pPr>
+            <a:r>
+              <a:rPr lang="en-CA" dirty="0">
+                <a:solidFill>
+                  <a:schemeClr val="tx1">
+                    <a:lumMod val="75000"/>
+                    <a:lumOff val="25000"/>
+                  </a:schemeClr>
+                </a:solidFill>
+              </a:rPr>
+              <a:t>Opportunities: Tick, Wait(), Yield(), Sync()</a:t>
+            </a:r>
+            <a:endParaRPr lang="de-CH" dirty="0">
+              <a:solidFill>
+                <a:schemeClr val="tx1">
+                  <a:lumMod val="75000"/>
+                  <a:lumOff val="25000"/>
+                </a:schemeClr>
+              </a:solidFill>
+            </a:endParaRPr>
+          </a:p>
+        </p:txBody>
+      </p:sp>
     </p:spTree>
     <p:extLst>
       <p:ext uri="{BB962C8B-B14F-4D97-AF65-F5344CB8AC3E}">
-        <p14:creationId xmlns:p14="http://schemas.microsoft.com/office/powerpoint/2010/main" val="4092189812"/>
+        <p14:creationId xmlns:p14="http://schemas.microsoft.com/office/powerpoint/2010/main" val="1916690929"/>
       </p:ext>
     </p:extLst>
   </p:cSld>
@@ -6088,6 +6127,13 @@
           <a:lstStyle/>
           <a:p>
             <a:r>
+              <a:rPr lang="de-CH" b="1" dirty="0"/>
+              <a:t>RTOS </a:t>
+            </a:r>
+            <a:br>
+              <a:rPr lang="de-CH" b="1" dirty="0"/>
+            </a:br>
+            <a:r>
               <a:rPr lang="en-CA" dirty="0"/>
               <a:t>OS Process States</a:t>
             </a:r>
@@ -6113,7 +6159,7 @@
         </p:blipFill>
         <p:spPr>
           <a:xfrm>
-            <a:off x="2222549" y="1690688"/>
+            <a:off x="2231341" y="1848950"/>
             <a:ext cx="7390823" cy="4122186"/>
           </a:xfrm>
           <a:prstGeom prst="rect">
@@ -6121,6 +6167,76 @@
           </a:prstGeom>
         </p:spPr>
       </p:pic>
+      <p:sp>
+        <p:nvSpPr>
+          <p:cNvPr id="3" name="Textfeld 2"/>
+          <p:cNvSpPr txBox="1"/>
+          <p:nvPr/>
+        </p:nvSpPr>
+        <p:spPr>
+          <a:xfrm>
+            <a:off x="936948" y="2215661"/>
+            <a:ext cx="2588786" cy="400110"/>
+          </a:xfrm>
+          <a:prstGeom prst="rect">
+            <a:avLst/>
+          </a:prstGeom>
+          <a:noFill/>
+        </p:spPr>
+        <p:txBody>
+          <a:bodyPr wrap="none" rtlCol="0">
+            <a:spAutoFit/>
+          </a:bodyPr>
+          <a:lstStyle/>
+          <a:p>
+            <a:pPr marL="285750" indent="-285750">
+              <a:buFont typeface="Arial" panose="020B0604020202020204" pitchFamily="34" charset="0"/>
+              <a:buChar char="•"/>
+            </a:pPr>
+            <a:r>
+              <a:rPr lang="en-CA" dirty="0">
+                <a:solidFill>
+                  <a:schemeClr val="tx1">
+                    <a:lumMod val="75000"/>
+                    <a:lumOff val="25000"/>
+                  </a:schemeClr>
+                </a:solidFill>
+              </a:rPr>
+              <a:t>Only </a:t>
+            </a:r>
+            <a:r>
+              <a:rPr lang="en-CA" sz="2000" dirty="0">
+                <a:solidFill>
+                  <a:schemeClr val="tx1">
+                    <a:lumMod val="75000"/>
+                    <a:lumOff val="25000"/>
+                  </a:schemeClr>
+                </a:solidFill>
+              </a:rPr>
+              <a:t>one</a:t>
+            </a:r>
+            <a:r>
+              <a:rPr lang="en-CA" dirty="0">
+                <a:solidFill>
+                  <a:schemeClr val="tx1">
+                    <a:lumMod val="75000"/>
+                    <a:lumOff val="25000"/>
+                  </a:schemeClr>
+                </a:solidFill>
+              </a:rPr>
+              <a:t> Task running</a:t>
+            </a:r>
+            <a:endParaRPr lang="de-CH" dirty="0">
+              <a:solidFill>
+                <a:schemeClr val="tx1">
+                  <a:lumMod val="75000"/>
+                  <a:lumOff val="25000"/>
+                </a:schemeClr>
+              </a:solidFill>
+            </a:endParaRPr>
+          </a:p>
+        </p:txBody>
+      </p:sp>
     </p:spTree>
     <p:extLst>
       <p:ext uri="{BB962C8B-B14F-4D97-AF65-F5344CB8AC3E}">

</xml_diff>

<commit_message>
Add comments to recap - uploadversion für students
</commit_message>
<xml_diff>
--- a/Recap_SW5_Ineichen_Stecher.pptx
+++ b/Recap_SW5_Ineichen_Stecher.pptx
@@ -212,7 +212,7 @@
           <a:p>
             <a:fld id="{6C024E82-8379-4655-9D6C-F4638CD4F191}" type="datetimeFigureOut">
               <a:rPr lang="de-CH" smtClean="0"/>
-              <a:t>25.10.2016</a:t>
+              <a:t>26.10.2016</a:t>
             </a:fld>
             <a:endParaRPr lang="de-CH"/>
           </a:p>
@@ -525,6 +525,556 @@
           <a:lstStyle/>
           <a:p>
             <a:r>
+              <a:rPr lang="en-CA" dirty="0" err="1"/>
+              <a:t>Wir</a:t>
+            </a:r>
+            <a:r>
+              <a:rPr lang="en-CA" dirty="0"/>
+              <a:t> </a:t>
+            </a:r>
+            <a:r>
+              <a:rPr lang="en-CA" dirty="0" err="1"/>
+              <a:t>nehmen</a:t>
+            </a:r>
+            <a:r>
+              <a:rPr lang="en-CA" dirty="0"/>
+              <a:t> </a:t>
+            </a:r>
+            <a:r>
+              <a:rPr lang="en-CA" dirty="0" err="1"/>
+              <a:t>es</a:t>
+            </a:r>
+            <a:r>
+              <a:rPr lang="en-CA" dirty="0"/>
+              <a:t> </a:t>
+            </a:r>
+            <a:r>
+              <a:rPr lang="en-CA" dirty="0" err="1"/>
+              <a:t>als</a:t>
+            </a:r>
+            <a:r>
+              <a:rPr lang="en-CA" baseline="0" dirty="0"/>
+              <a:t> fast </a:t>
+            </a:r>
+            <a:r>
+              <a:rPr lang="en-CA" baseline="0" dirty="0" err="1"/>
+              <a:t>gleichzeitig</a:t>
+            </a:r>
+            <a:r>
+              <a:rPr lang="en-CA" baseline="0" dirty="0"/>
+              <a:t> </a:t>
+            </a:r>
+            <a:r>
+              <a:rPr lang="en-CA" baseline="0" dirty="0" err="1"/>
+              <a:t>wahr</a:t>
+            </a:r>
+            <a:endParaRPr lang="en-CA" baseline="0" dirty="0"/>
+          </a:p>
+          <a:p>
+            <a:r>
+              <a:rPr lang="en-CA" baseline="0" dirty="0" err="1"/>
+              <a:t>Ist</a:t>
+            </a:r>
+            <a:r>
+              <a:rPr lang="en-CA" baseline="0" dirty="0"/>
+              <a:t> </a:t>
+            </a:r>
+            <a:r>
+              <a:rPr lang="en-CA" baseline="0" dirty="0" err="1"/>
+              <a:t>nicht</a:t>
+            </a:r>
+            <a:r>
+              <a:rPr lang="en-CA" baseline="0" dirty="0"/>
+              <a:t> AS FAST AS POSSIBLE</a:t>
+            </a:r>
+          </a:p>
+          <a:p>
+            <a:r>
+              <a:rPr lang="en-CA" baseline="0" dirty="0"/>
+              <a:t>General purpose OS </a:t>
+            </a:r>
+            <a:r>
+              <a:rPr lang="en-CA" baseline="0" dirty="0" err="1"/>
+              <a:t>kann</a:t>
+            </a:r>
+            <a:r>
+              <a:rPr lang="en-CA" baseline="0" dirty="0"/>
+              <a:t> das </a:t>
+            </a:r>
+            <a:r>
+              <a:rPr lang="en-CA" baseline="0" dirty="0" err="1"/>
+              <a:t>nicht</a:t>
+            </a:r>
+            <a:r>
+              <a:rPr lang="en-CA" baseline="0" dirty="0"/>
+              <a:t> </a:t>
+            </a:r>
+            <a:r>
+              <a:rPr lang="en-CA" baseline="0" dirty="0" err="1"/>
+              <a:t>erfüllen</a:t>
+            </a:r>
+            <a:r>
+              <a:rPr lang="en-CA" baseline="0" dirty="0"/>
+              <a:t> </a:t>
+            </a:r>
+            <a:endParaRPr lang="de-CH" dirty="0"/>
+          </a:p>
+        </p:txBody>
+      </p:sp>
+      <p:sp>
+        <p:nvSpPr>
+          <p:cNvPr id="4" name="Foliennummernplatzhalter 3"/>
+          <p:cNvSpPr>
+            <a:spLocks noGrp="1"/>
+          </p:cNvSpPr>
+          <p:nvPr>
+            <p:ph type="sldNum" sz="quarter" idx="10"/>
+          </p:nvPr>
+        </p:nvSpPr>
+        <p:spPr/>
+        <p:txBody>
+          <a:bodyPr/>
+          <a:lstStyle/>
+          <a:p>
+            <a:fld id="{F1F70B2C-B641-40EB-B295-6B68783F7EA2}" type="slidenum">
+              <a:rPr lang="de-CH" smtClean="0"/>
+              <a:t>2</a:t>
+            </a:fld>
+            <a:endParaRPr lang="de-CH"/>
+          </a:p>
+        </p:txBody>
+      </p:sp>
+    </p:spTree>
+    <p:extLst>
+      <p:ext uri="{BB962C8B-B14F-4D97-AF65-F5344CB8AC3E}">
+        <p14:creationId xmlns:p14="http://schemas.microsoft.com/office/powerpoint/2010/main" val="1730405232"/>
+      </p:ext>
+    </p:extLst>
+  </p:cSld>
+  <p:clrMapOvr>
+    <a:masterClrMapping/>
+  </p:clrMapOvr>
+</p:notes>
+</file>
+
+<file path=ppt/notesSlides/notesSlide2.xml><?xml version="1.0" encoding="utf-8"?>
+<p:notes xmlns:a="http://schemas.openxmlformats.org/drawingml/2006/main" xmlns:r="http://schemas.openxmlformats.org/officeDocument/2006/relationships" xmlns:p="http://schemas.openxmlformats.org/presentationml/2006/main">
+  <p:cSld>
+    <p:spTree>
+      <p:nvGrpSpPr>
+        <p:cNvPr id="1" name=""/>
+        <p:cNvGrpSpPr/>
+        <p:nvPr/>
+      </p:nvGrpSpPr>
+      <p:grpSpPr>
+        <a:xfrm>
+          <a:off x="0" y="0"/>
+          <a:ext cx="0" cy="0"/>
+          <a:chOff x="0" y="0"/>
+          <a:chExt cx="0" cy="0"/>
+        </a:xfrm>
+      </p:grpSpPr>
+      <p:sp>
+        <p:nvSpPr>
+          <p:cNvPr id="2" name="Folienbildplatzhalter 1"/>
+          <p:cNvSpPr>
+            <a:spLocks noGrp="1" noRot="1" noChangeAspect="1"/>
+          </p:cNvSpPr>
+          <p:nvPr>
+            <p:ph type="sldImg"/>
+          </p:nvPr>
+        </p:nvSpPr>
+        <p:spPr/>
+      </p:sp>
+      <p:sp>
+        <p:nvSpPr>
+          <p:cNvPr id="3" name="Notizenplatzhalter 2"/>
+          <p:cNvSpPr>
+            <a:spLocks noGrp="1"/>
+          </p:cNvSpPr>
+          <p:nvPr>
+            <p:ph type="body" idx="1"/>
+          </p:nvPr>
+        </p:nvSpPr>
+        <p:spPr/>
+        <p:txBody>
+          <a:bodyPr/>
+          <a:lstStyle/>
+          <a:p>
+            <a:r>
+              <a:rPr lang="en-CA" dirty="0" err="1"/>
+              <a:t>Diese</a:t>
+            </a:r>
+            <a:r>
+              <a:rPr lang="en-CA" baseline="0" dirty="0"/>
+              <a:t> </a:t>
+            </a:r>
+            <a:r>
+              <a:rPr lang="en-CA" baseline="0" dirty="0" err="1"/>
+              <a:t>drei</a:t>
+            </a:r>
+            <a:r>
+              <a:rPr lang="en-CA" baseline="0" dirty="0"/>
+              <a:t> </a:t>
+            </a:r>
+            <a:r>
+              <a:rPr lang="en-CA" baseline="0" dirty="0" err="1"/>
+              <a:t>Eingänge</a:t>
+            </a:r>
+            <a:r>
+              <a:rPr lang="en-CA" baseline="0" dirty="0"/>
+              <a:t> hat der Kernel </a:t>
+            </a:r>
+          </a:p>
+          <a:p>
+            <a:r>
+              <a:rPr lang="en-CA" baseline="0" dirty="0" err="1"/>
+              <a:t>Aufgaben</a:t>
+            </a:r>
+            <a:r>
+              <a:rPr lang="en-CA" baseline="0" dirty="0"/>
+              <a:t>: </a:t>
+            </a:r>
+            <a:r>
+              <a:rPr lang="en-CA" baseline="0" dirty="0" err="1"/>
+              <a:t>verteilt</a:t>
+            </a:r>
+            <a:r>
+              <a:rPr lang="en-CA" baseline="0" dirty="0"/>
+              <a:t> die </a:t>
+            </a:r>
+            <a:r>
+              <a:rPr lang="en-CA" baseline="0" dirty="0" err="1"/>
+              <a:t>Ressourcen</a:t>
+            </a:r>
+            <a:r>
+              <a:rPr lang="en-CA" baseline="0" dirty="0"/>
+              <a:t>, </a:t>
+            </a:r>
+            <a:r>
+              <a:rPr lang="en-CA" baseline="0" dirty="0" err="1"/>
+              <a:t>Kontrolle</a:t>
+            </a:r>
+            <a:r>
+              <a:rPr lang="en-CA" baseline="0" dirty="0"/>
+              <a:t> des </a:t>
+            </a:r>
+            <a:r>
+              <a:rPr lang="en-CA" baseline="0" dirty="0" err="1"/>
+              <a:t>Zugriffs</a:t>
+            </a:r>
+            <a:endParaRPr lang="en-CA" baseline="0" dirty="0"/>
+          </a:p>
+          <a:p>
+            <a:endParaRPr lang="de-CH" dirty="0"/>
+          </a:p>
+        </p:txBody>
+      </p:sp>
+      <p:sp>
+        <p:nvSpPr>
+          <p:cNvPr id="4" name="Foliennummernplatzhalter 3"/>
+          <p:cNvSpPr>
+            <a:spLocks noGrp="1"/>
+          </p:cNvSpPr>
+          <p:nvPr>
+            <p:ph type="sldNum" sz="quarter" idx="10"/>
+          </p:nvPr>
+        </p:nvSpPr>
+        <p:spPr/>
+        <p:txBody>
+          <a:bodyPr/>
+          <a:lstStyle/>
+          <a:p>
+            <a:fld id="{F1F70B2C-B641-40EB-B295-6B68783F7EA2}" type="slidenum">
+              <a:rPr lang="de-CH" smtClean="0"/>
+              <a:t>3</a:t>
+            </a:fld>
+            <a:endParaRPr lang="de-CH"/>
+          </a:p>
+        </p:txBody>
+      </p:sp>
+    </p:spTree>
+    <p:extLst>
+      <p:ext uri="{BB962C8B-B14F-4D97-AF65-F5344CB8AC3E}">
+        <p14:creationId xmlns:p14="http://schemas.microsoft.com/office/powerpoint/2010/main" val="1144308308"/>
+      </p:ext>
+    </p:extLst>
+  </p:cSld>
+  <p:clrMapOvr>
+    <a:masterClrMapping/>
+  </p:clrMapOvr>
+</p:notes>
+</file>
+
+<file path=ppt/notesSlides/notesSlide3.xml><?xml version="1.0" encoding="utf-8"?>
+<p:notes xmlns:a="http://schemas.openxmlformats.org/drawingml/2006/main" xmlns:r="http://schemas.openxmlformats.org/officeDocument/2006/relationships" xmlns:p="http://schemas.openxmlformats.org/presentationml/2006/main">
+  <p:cSld>
+    <p:spTree>
+      <p:nvGrpSpPr>
+        <p:cNvPr id="1" name=""/>
+        <p:cNvGrpSpPr/>
+        <p:nvPr/>
+      </p:nvGrpSpPr>
+      <p:grpSpPr>
+        <a:xfrm>
+          <a:off x="0" y="0"/>
+          <a:ext cx="0" cy="0"/>
+          <a:chOff x="0" y="0"/>
+          <a:chExt cx="0" cy="0"/>
+        </a:xfrm>
+      </p:grpSpPr>
+      <p:sp>
+        <p:nvSpPr>
+          <p:cNvPr id="2" name="Folienbildplatzhalter 1"/>
+          <p:cNvSpPr>
+            <a:spLocks noGrp="1" noRot="1" noChangeAspect="1"/>
+          </p:cNvSpPr>
+          <p:nvPr>
+            <p:ph type="sldImg"/>
+          </p:nvPr>
+        </p:nvSpPr>
+        <p:spPr/>
+      </p:sp>
+      <p:sp>
+        <p:nvSpPr>
+          <p:cNvPr id="3" name="Notizenplatzhalter 2"/>
+          <p:cNvSpPr>
+            <a:spLocks noGrp="1"/>
+          </p:cNvSpPr>
+          <p:nvPr>
+            <p:ph type="body" idx="1"/>
+          </p:nvPr>
+        </p:nvSpPr>
+        <p:spPr/>
+        <p:txBody>
+          <a:bodyPr/>
+          <a:lstStyle/>
+          <a:p>
+            <a:r>
+              <a:rPr lang="en-CA" dirty="0"/>
+              <a:t>Der</a:t>
+            </a:r>
+            <a:r>
+              <a:rPr lang="en-CA" baseline="0" dirty="0"/>
+              <a:t> Scheduler </a:t>
+            </a:r>
+            <a:r>
+              <a:rPr lang="en-CA" baseline="0" dirty="0" err="1"/>
+              <a:t>sagt</a:t>
+            </a:r>
+            <a:r>
+              <a:rPr lang="en-CA" baseline="0" dirty="0"/>
+              <a:t> </a:t>
+            </a:r>
+            <a:r>
+              <a:rPr lang="en-CA" baseline="0" dirty="0" err="1"/>
+              <a:t>welcher</a:t>
+            </a:r>
+            <a:r>
+              <a:rPr lang="en-CA" baseline="0" dirty="0"/>
+              <a:t> </a:t>
+            </a:r>
+            <a:r>
+              <a:rPr lang="en-CA" baseline="0" dirty="0" err="1"/>
+              <a:t>Tast</a:t>
+            </a:r>
+            <a:r>
+              <a:rPr lang="en-CA" baseline="0" dirty="0"/>
+              <a:t> nun </a:t>
+            </a:r>
+            <a:r>
+              <a:rPr lang="en-CA" baseline="0" dirty="0" err="1"/>
+              <a:t>zeit</a:t>
+            </a:r>
+            <a:r>
+              <a:rPr lang="en-CA" baseline="0" dirty="0"/>
+              <a:t> </a:t>
+            </a:r>
+            <a:r>
+              <a:rPr lang="en-CA" baseline="0" dirty="0" err="1"/>
+              <a:t>bekommt</a:t>
+            </a:r>
+            <a:r>
+              <a:rPr lang="en-CA" baseline="0" dirty="0"/>
+              <a:t> </a:t>
+            </a:r>
+            <a:r>
+              <a:rPr lang="en-CA" baseline="0" dirty="0" err="1"/>
+              <a:t>zum</a:t>
+            </a:r>
+            <a:r>
+              <a:rPr lang="en-CA" baseline="0" dirty="0"/>
+              <a:t> </a:t>
+            </a:r>
+            <a:r>
+              <a:rPr lang="en-CA" baseline="0" dirty="0" err="1"/>
+              <a:t>rechnen</a:t>
+            </a:r>
+            <a:r>
+              <a:rPr lang="en-CA" baseline="0" dirty="0"/>
+              <a:t>, </a:t>
+            </a:r>
+            <a:r>
+              <a:rPr lang="en-CA" baseline="0" dirty="0" err="1"/>
+              <a:t>verschiedene</a:t>
+            </a:r>
+            <a:r>
+              <a:rPr lang="en-CA" baseline="0" dirty="0"/>
+              <a:t> </a:t>
+            </a:r>
+            <a:r>
+              <a:rPr lang="en-CA" baseline="0" dirty="0" err="1"/>
+              <a:t>Prinzipien</a:t>
+            </a:r>
+            <a:r>
+              <a:rPr lang="en-CA" baseline="0" dirty="0"/>
+              <a:t> (</a:t>
+            </a:r>
+            <a:r>
+              <a:rPr lang="en-CA" baseline="0" dirty="0" err="1"/>
+              <a:t>Roud</a:t>
+            </a:r>
+            <a:r>
+              <a:rPr lang="en-CA" baseline="0" dirty="0"/>
+              <a:t> Robin) </a:t>
+            </a:r>
+            <a:r>
+              <a:rPr lang="en-CA" baseline="0" dirty="0" err="1"/>
+              <a:t>nach</a:t>
+            </a:r>
+            <a:r>
+              <a:rPr lang="en-CA" baseline="0" dirty="0"/>
+              <a:t> </a:t>
+            </a:r>
+            <a:r>
+              <a:rPr lang="en-CA" baseline="0" dirty="0" err="1"/>
+              <a:t>einer</a:t>
+            </a:r>
+            <a:r>
+              <a:rPr lang="en-CA" baseline="0" dirty="0"/>
+              <a:t> </a:t>
+            </a:r>
+            <a:r>
+              <a:rPr lang="en-CA" baseline="0" dirty="0" err="1"/>
+              <a:t>gewissen</a:t>
+            </a:r>
+            <a:r>
+              <a:rPr lang="en-CA" baseline="0" dirty="0"/>
+              <a:t> Zeit </a:t>
+            </a:r>
+            <a:r>
+              <a:rPr lang="en-CA" baseline="0" dirty="0" err="1"/>
+              <a:t>kommt</a:t>
+            </a:r>
+            <a:r>
+              <a:rPr lang="en-CA" baseline="0" dirty="0"/>
+              <a:t> </a:t>
+            </a:r>
+            <a:r>
+              <a:rPr lang="en-CA" baseline="0" dirty="0" err="1"/>
+              <a:t>nächster</a:t>
+            </a:r>
+            <a:r>
+              <a:rPr lang="en-CA" baseline="0" dirty="0"/>
+              <a:t> </a:t>
+            </a:r>
+            <a:r>
+              <a:rPr lang="en-CA" baseline="0" dirty="0" err="1"/>
+              <a:t>hinter</a:t>
+            </a:r>
+            <a:r>
+              <a:rPr lang="en-CA" baseline="0" dirty="0"/>
+              <a:t> </a:t>
+            </a:r>
+            <a:r>
+              <a:rPr lang="en-CA" baseline="0" dirty="0" err="1"/>
+              <a:t>anfangen</a:t>
+            </a:r>
+            <a:endParaRPr lang="de-CH" dirty="0"/>
+          </a:p>
+        </p:txBody>
+      </p:sp>
+      <p:sp>
+        <p:nvSpPr>
+          <p:cNvPr id="4" name="Foliennummernplatzhalter 3"/>
+          <p:cNvSpPr>
+            <a:spLocks noGrp="1"/>
+          </p:cNvSpPr>
+          <p:nvPr>
+            <p:ph type="sldNum" sz="quarter" idx="10"/>
+          </p:nvPr>
+        </p:nvSpPr>
+        <p:spPr/>
+        <p:txBody>
+          <a:bodyPr/>
+          <a:lstStyle/>
+          <a:p>
+            <a:fld id="{F1F70B2C-B641-40EB-B295-6B68783F7EA2}" type="slidenum">
+              <a:rPr lang="de-CH" smtClean="0"/>
+              <a:t>4</a:t>
+            </a:fld>
+            <a:endParaRPr lang="de-CH"/>
+          </a:p>
+        </p:txBody>
+      </p:sp>
+    </p:spTree>
+    <p:extLst>
+      <p:ext uri="{BB962C8B-B14F-4D97-AF65-F5344CB8AC3E}">
+        <p14:creationId xmlns:p14="http://schemas.microsoft.com/office/powerpoint/2010/main" val="4135802671"/>
+      </p:ext>
+    </p:extLst>
+  </p:cSld>
+  <p:clrMapOvr>
+    <a:masterClrMapping/>
+  </p:clrMapOvr>
+</p:notes>
+</file>
+
+<file path=ppt/notesSlides/notesSlide4.xml><?xml version="1.0" encoding="utf-8"?>
+<p:notes xmlns:a="http://schemas.openxmlformats.org/drawingml/2006/main" xmlns:r="http://schemas.openxmlformats.org/officeDocument/2006/relationships" xmlns:p="http://schemas.openxmlformats.org/presentationml/2006/main">
+  <p:cSld>
+    <p:spTree>
+      <p:nvGrpSpPr>
+        <p:cNvPr id="1" name=""/>
+        <p:cNvGrpSpPr/>
+        <p:nvPr/>
+      </p:nvGrpSpPr>
+      <p:grpSpPr>
+        <a:xfrm>
+          <a:off x="0" y="0"/>
+          <a:ext cx="0" cy="0"/>
+          <a:chOff x="0" y="0"/>
+          <a:chExt cx="0" cy="0"/>
+        </a:xfrm>
+      </p:grpSpPr>
+      <p:sp>
+        <p:nvSpPr>
+          <p:cNvPr id="2" name="Folienbildplatzhalter 1"/>
+          <p:cNvSpPr>
+            <a:spLocks noGrp="1" noRot="1" noChangeAspect="1"/>
+          </p:cNvSpPr>
+          <p:nvPr>
+            <p:ph type="sldImg"/>
+          </p:nvPr>
+        </p:nvSpPr>
+        <p:spPr/>
+      </p:sp>
+      <p:sp>
+        <p:nvSpPr>
+          <p:cNvPr id="3" name="Notizenplatzhalter 2"/>
+          <p:cNvSpPr>
+            <a:spLocks noGrp="1"/>
+          </p:cNvSpPr>
+          <p:nvPr>
+            <p:ph type="body" idx="1"/>
+          </p:nvPr>
+        </p:nvSpPr>
+        <p:spPr/>
+        <p:txBody>
+          <a:bodyPr/>
+          <a:lstStyle/>
+          <a:p>
+            <a:r>
               <a:rPr lang="de-CH" dirty="0"/>
               <a:t>Bis hier</a:t>
             </a:r>
@@ -532,7 +1082,98 @@
               <a:rPr lang="de-CH" baseline="0" dirty="0"/>
               <a:t> Silvano</a:t>
             </a:r>
-            <a:endParaRPr lang="de-CH" dirty="0"/>
+          </a:p>
+          <a:p>
+            <a:r>
+              <a:rPr lang="en-CA" baseline="0" dirty="0" err="1"/>
+              <a:t>Es</a:t>
+            </a:r>
+            <a:r>
+              <a:rPr lang="en-CA" baseline="0" dirty="0"/>
+              <a:t> </a:t>
+            </a:r>
+            <a:r>
+              <a:rPr lang="en-CA" baseline="0" dirty="0" err="1"/>
+              <a:t>gibt</a:t>
+            </a:r>
+            <a:r>
+              <a:rPr lang="en-CA" baseline="0" dirty="0"/>
+              <a:t> </a:t>
+            </a:r>
+            <a:r>
+              <a:rPr lang="en-CA" baseline="0" dirty="0" err="1"/>
+              <a:t>zwei</a:t>
+            </a:r>
+            <a:r>
+              <a:rPr lang="en-CA" baseline="0" dirty="0"/>
+              <a:t> </a:t>
+            </a:r>
+            <a:r>
+              <a:rPr lang="en-CA" baseline="0" dirty="0" err="1"/>
+              <a:t>arten</a:t>
+            </a:r>
+            <a:r>
+              <a:rPr lang="en-CA" baseline="0" dirty="0"/>
+              <a:t> </a:t>
+            </a:r>
+            <a:r>
+              <a:rPr lang="en-CA" baseline="0" dirty="0" err="1"/>
+              <a:t>preemtive</a:t>
+            </a:r>
+            <a:r>
+              <a:rPr lang="en-CA" baseline="0" dirty="0"/>
+              <a:t> and cooperative</a:t>
+            </a:r>
+          </a:p>
+          <a:p>
+            <a:r>
+              <a:rPr lang="en-CA" baseline="0" dirty="0" err="1"/>
+              <a:t>Haben</a:t>
+            </a:r>
+            <a:r>
+              <a:rPr lang="en-CA" baseline="0" dirty="0"/>
+              <a:t> </a:t>
+            </a:r>
+            <a:r>
+              <a:rPr lang="en-CA" baseline="0" dirty="0" err="1"/>
+              <a:t>wir</a:t>
+            </a:r>
+            <a:r>
+              <a:rPr lang="en-CA" baseline="0" dirty="0"/>
+              <a:t> </a:t>
+            </a:r>
+            <a:r>
+              <a:rPr lang="en-CA" baseline="0" dirty="0" err="1"/>
+              <a:t>vorhere</a:t>
+            </a:r>
+            <a:r>
+              <a:rPr lang="en-CA" baseline="0" dirty="0"/>
+              <a:t> </a:t>
+            </a:r>
+            <a:r>
+              <a:rPr lang="en-CA" baseline="0" dirty="0" err="1"/>
+              <a:t>schon</a:t>
+            </a:r>
+            <a:r>
+              <a:rPr lang="en-CA" baseline="0" dirty="0"/>
+              <a:t> </a:t>
+            </a:r>
+            <a:r>
+              <a:rPr lang="en-CA" baseline="0" dirty="0" err="1"/>
+              <a:t>gesehen</a:t>
+            </a:r>
+            <a:r>
+              <a:rPr lang="en-CA" baseline="0" dirty="0"/>
+              <a:t> </a:t>
+            </a:r>
+            <a:r>
+              <a:rPr lang="en-CA" baseline="0" dirty="0" err="1"/>
+              <a:t>mit</a:t>
+            </a:r>
+            <a:r>
+              <a:rPr lang="en-CA" baseline="0" dirty="0"/>
+              <a:t> Interrupts</a:t>
+            </a:r>
           </a:p>
         </p:txBody>
       </p:sp>
@@ -798,7 +1439,7 @@
           <a:p>
             <a:fld id="{CFF0E3E0-6B59-4FD8-AEDD-9E53307F786E}" type="datetimeFigureOut">
               <a:rPr lang="de-CH" smtClean="0"/>
-              <a:t>25.10.2016</a:t>
+              <a:t>26.10.2016</a:t>
             </a:fld>
             <a:endParaRPr lang="de-CH"/>
           </a:p>
@@ -1006,7 +1647,7 @@
           <a:p>
             <a:fld id="{CFF0E3E0-6B59-4FD8-AEDD-9E53307F786E}" type="datetimeFigureOut">
               <a:rPr lang="de-CH" smtClean="0"/>
-              <a:t>25.10.2016</a:t>
+              <a:t>26.10.2016</a:t>
             </a:fld>
             <a:endParaRPr lang="de-CH"/>
           </a:p>
@@ -1262,7 +1903,7 @@
           <a:p>
             <a:fld id="{CFF0E3E0-6B59-4FD8-AEDD-9E53307F786E}" type="datetimeFigureOut">
               <a:rPr lang="de-CH" smtClean="0"/>
-              <a:t>25.10.2016</a:t>
+              <a:t>26.10.2016</a:t>
             </a:fld>
             <a:endParaRPr lang="de-CH"/>
           </a:p>
@@ -1436,7 +2077,7 @@
           <a:p>
             <a:fld id="{CFF0E3E0-6B59-4FD8-AEDD-9E53307F786E}" type="datetimeFigureOut">
               <a:rPr lang="de-CH" smtClean="0"/>
-              <a:t>25.10.2016</a:t>
+              <a:t>26.10.2016</a:t>
             </a:fld>
             <a:endParaRPr lang="de-CH"/>
           </a:p>
@@ -1779,7 +2420,7 @@
           <a:p>
             <a:fld id="{CFF0E3E0-6B59-4FD8-AEDD-9E53307F786E}" type="datetimeFigureOut">
               <a:rPr lang="de-CH" smtClean="0"/>
-              <a:t>25.10.2016</a:t>
+              <a:t>26.10.2016</a:t>
             </a:fld>
             <a:endParaRPr lang="de-CH"/>
           </a:p>
@@ -2054,7 +2695,7 @@
           <a:p>
             <a:fld id="{CFF0E3E0-6B59-4FD8-AEDD-9E53307F786E}" type="datetimeFigureOut">
               <a:rPr lang="de-CH" smtClean="0"/>
-              <a:t>25.10.2016</a:t>
+              <a:t>26.10.2016</a:t>
             </a:fld>
             <a:endParaRPr lang="de-CH"/>
           </a:p>
@@ -2433,7 +3074,7 @@
           <a:p>
             <a:fld id="{CFF0E3E0-6B59-4FD8-AEDD-9E53307F786E}" type="datetimeFigureOut">
               <a:rPr lang="de-CH" smtClean="0"/>
-              <a:t>25.10.2016</a:t>
+              <a:t>26.10.2016</a:t>
             </a:fld>
             <a:endParaRPr lang="de-CH"/>
           </a:p>
@@ -2551,7 +3192,7 @@
           <a:p>
             <a:fld id="{CFF0E3E0-6B59-4FD8-AEDD-9E53307F786E}" type="datetimeFigureOut">
               <a:rPr lang="de-CH" smtClean="0"/>
-              <a:t>25.10.2016</a:t>
+              <a:t>26.10.2016</a:t>
             </a:fld>
             <a:endParaRPr lang="de-CH"/>
           </a:p>
@@ -2722,7 +3363,7 @@
           <a:p>
             <a:fld id="{CFF0E3E0-6B59-4FD8-AEDD-9E53307F786E}" type="datetimeFigureOut">
               <a:rPr lang="de-CH" smtClean="0"/>
-              <a:t>25.10.2016</a:t>
+              <a:t>26.10.2016</a:t>
             </a:fld>
             <a:endParaRPr lang="de-CH"/>
           </a:p>
@@ -3076,7 +3717,7 @@
           <a:p>
             <a:fld id="{CFF0E3E0-6B59-4FD8-AEDD-9E53307F786E}" type="datetimeFigureOut">
               <a:rPr lang="de-CH" smtClean="0"/>
-              <a:t>25.10.2016</a:t>
+              <a:t>26.10.2016</a:t>
             </a:fld>
             <a:endParaRPr lang="de-CH"/>
           </a:p>
@@ -3458,7 +4099,7 @@
           <a:p>
             <a:fld id="{CFF0E3E0-6B59-4FD8-AEDD-9E53307F786E}" type="datetimeFigureOut">
               <a:rPr lang="de-CH" smtClean="0"/>
-              <a:t>25.10.2016</a:t>
+              <a:t>26.10.2016</a:t>
             </a:fld>
             <a:endParaRPr lang="de-CH"/>
           </a:p>
@@ -3745,7 +4386,7 @@
           <a:p>
             <a:fld id="{CFF0E3E0-6B59-4FD8-AEDD-9E53307F786E}" type="datetimeFigureOut">
               <a:rPr lang="de-CH" smtClean="0"/>
-              <a:t>25.10.2016</a:t>
+              <a:t>26.10.2016</a:t>
             </a:fld>
             <a:endParaRPr lang="de-CH"/>
           </a:p>
@@ -6447,34 +7088,34 @@
         </p:spPr>
         <p:txBody>
           <a:bodyPr>
-            <a:normAutofit lnSpcReduction="10000"/>
+            <a:normAutofit fontScale="85000" lnSpcReduction="20000"/>
           </a:bodyPr>
           <a:lstStyle/>
           <a:p>
             <a:r>
-              <a:rPr lang="en-CA" dirty="0"/>
+              <a:rPr lang="en-CA" sz="2300" dirty="0"/>
               <a:t>Solves synchronization problems</a:t>
             </a:r>
           </a:p>
           <a:p>
-            <a:endParaRPr lang="en-CA" dirty="0"/>
-          </a:p>
-          <a:p>
-            <a:r>
-              <a:rPr lang="en-CA" dirty="0"/>
+            <a:endParaRPr lang="en-CA" sz="2300" dirty="0"/>
+          </a:p>
+          <a:p>
+            <a:r>
+              <a:rPr lang="en-CA" sz="2300" dirty="0"/>
               <a:t>Quasi-concurrent execution of services </a:t>
             </a:r>
           </a:p>
           <a:p>
-            <a:endParaRPr lang="en-CA" dirty="0"/>
-          </a:p>
-          <a:p>
-            <a:r>
-              <a:rPr lang="en-CA" dirty="0"/>
+            <a:endParaRPr lang="en-CA" sz="2300" dirty="0"/>
+          </a:p>
+          <a:p>
+            <a:r>
+              <a:rPr lang="en-CA" sz="2300" dirty="0"/>
               <a:t>Close to Hardware </a:t>
             </a:r>
             <a:r>
-              <a:rPr lang="en-CA" dirty="0">
+              <a:rPr lang="en-CA" sz="2300" dirty="0">
                 <a:sym typeface="Wingdings" panose="05000000000000000000" pitchFamily="2" charset="2"/>
               </a:rPr>
               <a:t> better performance</a:t>
@@ -6483,7 +7124,7 @@
           <a:p>
             <a:pPr lvl="1"/>
             <a:r>
-              <a:rPr lang="en-CA" dirty="0">
+              <a:rPr lang="en-CA" sz="2300" dirty="0">
                 <a:sym typeface="Wingdings" panose="05000000000000000000" pitchFamily="2" charset="2"/>
               </a:rPr>
               <a:t>OS needs Driver</a:t>
@@ -6492,7 +7133,7 @@
           <a:p>
             <a:pPr lvl="1"/>
             <a:r>
-              <a:rPr lang="en-CA" dirty="0">
+              <a:rPr lang="en-CA" sz="2300" dirty="0">
                 <a:sym typeface="Wingdings" panose="05000000000000000000" pitchFamily="2" charset="2"/>
               </a:rPr>
               <a:t>RTOS direct connected</a:t>
@@ -6500,7 +7141,7 @@
           </a:p>
           <a:p>
             <a:pPr lvl="1"/>
-            <a:endParaRPr lang="en-CA" dirty="0">
+            <a:endParaRPr lang="en-CA" sz="2300" dirty="0">
               <a:sym typeface="Wingdings" panose="05000000000000000000" pitchFamily="2" charset="2"/>
             </a:endParaRPr>
           </a:p>
@@ -6509,7 +7150,7 @@
               <a:buNone/>
             </a:pPr>
             <a:r>
-              <a:rPr lang="en-CA" sz="2000" dirty="0">
+              <a:rPr lang="en-CA" sz="2300" dirty="0">
                 <a:sym typeface="Wingdings" panose="05000000000000000000" pitchFamily="2" charset="2"/>
               </a:rPr>
               <a:t>Correct Result at correct time, independent of System load, in a deterministic and foreseeable way</a:t>
@@ -6519,13 +7160,13 @@
             <a:pPr marL="292608" lvl="1">
               <a:buNone/>
             </a:pPr>
-            <a:endParaRPr lang="en-CA" sz="2000" dirty="0">
+            <a:endParaRPr lang="en-CA" sz="2300" dirty="0">
               <a:sym typeface="Wingdings" panose="05000000000000000000" pitchFamily="2" charset="2"/>
             </a:endParaRPr>
           </a:p>
           <a:p>
             <a:r>
-              <a:rPr lang="en-CA" dirty="0">
+              <a:rPr lang="en-CA" sz="2300" dirty="0">
                 <a:sym typeface="Wingdings" panose="05000000000000000000" pitchFamily="2" charset="2"/>
               </a:rPr>
               <a:t>Requirements for standard OS and RTOS are different</a:t>
@@ -6610,7 +7251,7 @@
           </p:nvPr>
         </p:nvPicPr>
         <p:blipFill>
-          <a:blip r:embed="rId2"/>
+          <a:blip r:embed="rId3"/>
           <a:stretch>
             <a:fillRect/>
           </a:stretch>
@@ -6778,7 +7419,7 @@
           </p:nvPr>
         </p:nvPicPr>
         <p:blipFill>
-          <a:blip r:embed="rId2"/>
+          <a:blip r:embed="rId3"/>
           <a:stretch>
             <a:fillRect/>
           </a:stretch>
@@ -7107,111 +7748,113 @@
         </p:nvSpPr>
         <p:spPr/>
         <p:txBody>
-          <a:bodyPr/>
+          <a:bodyPr>
+            <a:normAutofit/>
+          </a:bodyPr>
           <a:lstStyle/>
           <a:p>
             <a:r>
-              <a:rPr lang="en-US" b="1" dirty="0"/>
+              <a:rPr lang="en-US" sz="2400" b="1" dirty="0"/>
               <a:t>Kernel</a:t>
             </a:r>
-            <a:endParaRPr lang="en-US" dirty="0"/>
+            <a:endParaRPr lang="en-US" sz="2400" dirty="0"/>
           </a:p>
           <a:p>
             <a:pPr lvl="1"/>
             <a:r>
-              <a:rPr lang="en-US" dirty="0"/>
+              <a:rPr lang="en-US" sz="2000" dirty="0"/>
               <a:t>Small Kernel, </a:t>
             </a:r>
             <a:r>
-              <a:rPr lang="en-US" b="1" dirty="0"/>
+              <a:rPr lang="en-US" sz="2000" b="1" dirty="0"/>
               <a:t>implemented in C</a:t>
             </a:r>
           </a:p>
           <a:p>
             <a:pPr lvl="1"/>
-            <a:endParaRPr lang="en-US" dirty="0"/>
+            <a:endParaRPr lang="en-US" sz="2000" dirty="0"/>
           </a:p>
           <a:p>
             <a:pPr lvl="1"/>
             <a:r>
-              <a:rPr lang="en-US" b="1" dirty="0"/>
+              <a:rPr lang="en-US" sz="2000" b="1" dirty="0"/>
               <a:t>Preemptive</a:t>
             </a:r>
             <a:r>
-              <a:rPr lang="en-US" dirty="0"/>
+              <a:rPr lang="en-US" sz="2000" dirty="0"/>
               <a:t> or </a:t>
             </a:r>
             <a:r>
-              <a:rPr lang="en-US" b="1" dirty="0"/>
+              <a:rPr lang="en-US" sz="2000" b="1" dirty="0"/>
               <a:t>cooperative</a:t>
             </a:r>
             <a:r>
-              <a:rPr lang="en-US" dirty="0"/>
+              <a:rPr lang="en-US" sz="2000" dirty="0"/>
               <a:t> scheduler mode (at compile </a:t>
             </a:r>
             <a:r>
-              <a:rPr lang="de-CH" dirty="0"/>
+              <a:rPr lang="de-CH" sz="2000" dirty="0"/>
               <a:t>time)</a:t>
             </a:r>
           </a:p>
           <a:p>
             <a:pPr lvl="1"/>
-            <a:endParaRPr lang="de-CH" dirty="0"/>
+            <a:endParaRPr lang="de-CH" sz="2000" dirty="0"/>
           </a:p>
           <a:p>
             <a:pPr lvl="1"/>
             <a:r>
-              <a:rPr lang="en-US" dirty="0"/>
+              <a:rPr lang="en-US" sz="2000" dirty="0"/>
               <a:t>Kernel only needs </a:t>
             </a:r>
             <a:r>
-              <a:rPr lang="en-US" b="1" dirty="0"/>
+              <a:rPr lang="en-US" sz="2000" b="1" dirty="0"/>
               <a:t>tick interrupt </a:t>
             </a:r>
             <a:r>
-              <a:rPr lang="en-US" dirty="0"/>
+              <a:rPr lang="en-US" sz="2000" dirty="0"/>
               <a:t>and </a:t>
             </a:r>
             <a:r>
-              <a:rPr lang="en-US" b="1" dirty="0"/>
+              <a:rPr lang="en-US" sz="2000" b="1" dirty="0"/>
               <a:t>software interrupt</a:t>
             </a:r>
           </a:p>
           <a:p>
             <a:pPr lvl="1"/>
-            <a:endParaRPr lang="en-US" b="1" dirty="0"/>
+            <a:endParaRPr lang="en-US" sz="2000" b="1" dirty="0"/>
           </a:p>
           <a:p>
             <a:pPr lvl="1"/>
             <a:r>
-              <a:rPr lang="en-US" dirty="0"/>
+              <a:rPr lang="en-US" sz="2000" dirty="0"/>
               <a:t>’Ticks’ provide time base for RTOS (Typically 10 </a:t>
             </a:r>
             <a:r>
-              <a:rPr lang="en-US" dirty="0" err="1"/>
+              <a:rPr lang="en-US" sz="2000" dirty="0" err="1"/>
               <a:t>ms</a:t>
             </a:r>
             <a:r>
-              <a:rPr lang="en-US" dirty="0"/>
+              <a:rPr lang="en-US" sz="2000" dirty="0"/>
               <a:t> or 1 </a:t>
             </a:r>
             <a:r>
-              <a:rPr lang="en-US" dirty="0" err="1"/>
+              <a:rPr lang="en-US" sz="2000" dirty="0" err="1"/>
               <a:t>ms</a:t>
             </a:r>
             <a:r>
-              <a:rPr lang="en-US" dirty="0"/>
+              <a:rPr lang="en-US" sz="2000" dirty="0"/>
               <a:t> tick period)</a:t>
             </a:r>
-            <a:endParaRPr lang="en-US" b="1" dirty="0"/>
+            <a:endParaRPr lang="en-US" sz="2000" b="1" dirty="0"/>
           </a:p>
           <a:p>
             <a:pPr lvl="1"/>
-            <a:endParaRPr lang="en-US" b="1" dirty="0"/>
+            <a:endParaRPr lang="en-US" sz="2000" b="1" dirty="0"/>
           </a:p>
           <a:p>
             <a:pPr lvl="1"/>
-            <a:endParaRPr lang="de-CH" dirty="0"/>
+            <a:endParaRPr lang="de-CH" sz="2000" dirty="0"/>
           </a:p>
         </p:txBody>
       </p:sp>
@@ -7291,46 +7934,48 @@
         </p:nvSpPr>
         <p:spPr/>
         <p:txBody>
-          <a:bodyPr/>
+          <a:bodyPr>
+            <a:normAutofit/>
+          </a:bodyPr>
           <a:lstStyle/>
           <a:p>
-            <a:endParaRPr lang="de-CH" b="1" dirty="0"/>
-          </a:p>
-          <a:p>
-            <a:r>
-              <a:rPr lang="de-CH" b="1" dirty="0"/>
+            <a:endParaRPr lang="de-CH" sz="2400" b="1" dirty="0"/>
+          </a:p>
+          <a:p>
+            <a:r>
+              <a:rPr lang="de-CH" sz="2400" b="1" dirty="0"/>
               <a:t>Tasks</a:t>
             </a:r>
           </a:p>
           <a:p>
             <a:pPr lvl="1"/>
             <a:r>
-              <a:rPr lang="en-US" dirty="0"/>
+              <a:rPr lang="en-US" sz="2000" dirty="0"/>
               <a:t>Tasks are running with stack in the ’heap’</a:t>
             </a:r>
           </a:p>
           <a:p>
             <a:pPr lvl="1"/>
-            <a:endParaRPr lang="en-US" dirty="0"/>
+            <a:endParaRPr lang="en-US" sz="2000" dirty="0"/>
           </a:p>
           <a:p>
             <a:pPr lvl="1"/>
             <a:r>
-              <a:rPr lang="en-US" dirty="0"/>
+              <a:rPr lang="en-US" sz="2000" dirty="0"/>
               <a:t>Tasks are (usually) staying in an endless loop</a:t>
             </a:r>
           </a:p>
           <a:p>
             <a:pPr lvl="1"/>
-            <a:endParaRPr lang="en-US" dirty="0"/>
+            <a:endParaRPr lang="en-US" sz="2000" dirty="0"/>
           </a:p>
           <a:p>
             <a:pPr lvl="1"/>
             <a:r>
-              <a:rPr lang="en-US" dirty="0"/>
+              <a:rPr lang="en-US" sz="2000" dirty="0"/>
               <a:t>Software interrupt used to switch task context</a:t>
             </a:r>
-            <a:endParaRPr lang="de-CH" b="1" dirty="0"/>
+            <a:endParaRPr lang="de-CH" sz="2000" b="1" dirty="0"/>
           </a:p>
         </p:txBody>
       </p:sp>

</xml_diff>